<commit_message>
Modify codes and pptx final
</commit_message>
<xml_diff>
--- a/semi_projects/쇼핑몰 옷 사이즈 확인 크롤링/쇼핑몰 옷 사이즈 확인 크롤링.pptx
+++ b/semi_projects/쇼핑몰 옷 사이즈 확인 크롤링/쇼핑몰 옷 사이즈 확인 크롤링.pptx
@@ -17,17 +17,16 @@
     <p:sldId id="295" r:id="rId11"/>
     <p:sldId id="292" r:id="rId12"/>
     <p:sldId id="293" r:id="rId13"/>
-    <p:sldId id="296" r:id="rId14"/>
+    <p:sldId id="298" r:id="rId14"/>
     <p:sldId id="294" r:id="rId15"/>
-    <p:sldId id="280" r:id="rId16"/>
-    <p:sldId id="281" r:id="rId17"/>
-    <p:sldId id="282" r:id="rId18"/>
-    <p:sldId id="283" r:id="rId19"/>
-    <p:sldId id="284" r:id="rId20"/>
-    <p:sldId id="285" r:id="rId21"/>
-    <p:sldId id="286" r:id="rId22"/>
-    <p:sldId id="287" r:id="rId23"/>
-    <p:sldId id="276" r:id="rId24"/>
+    <p:sldId id="299" r:id="rId16"/>
+    <p:sldId id="302" r:id="rId17"/>
+    <p:sldId id="296" r:id="rId18"/>
+    <p:sldId id="287" r:id="rId19"/>
+    <p:sldId id="303" r:id="rId20"/>
+    <p:sldId id="305" r:id="rId21"/>
+    <p:sldId id="297" r:id="rId22"/>
+    <p:sldId id="276" r:id="rId23"/>
   </p:sldIdLst>
   <p:sldSz cx="12192000" cy="6858000"/>
   <p:notesSz cx="6858000" cy="9144000"/>
@@ -292,7 +291,7 @@
           <a:p>
             <a:fld id="{D512FCAD-8E72-4490-9D67-FF3ADE8F49C3}" type="datetimeFigureOut">
               <a:rPr lang="ko-KR" altLang="en-US" smtClean="0"/>
-              <a:t>2021-08-27</a:t>
+              <a:t>2021-08-29</a:t>
             </a:fld>
             <a:endParaRPr lang="ko-KR" altLang="en-US"/>
           </a:p>
@@ -490,7 +489,7 @@
           <a:p>
             <a:fld id="{D512FCAD-8E72-4490-9D67-FF3ADE8F49C3}" type="datetimeFigureOut">
               <a:rPr lang="ko-KR" altLang="en-US" smtClean="0"/>
-              <a:t>2021-08-27</a:t>
+              <a:t>2021-08-29</a:t>
             </a:fld>
             <a:endParaRPr lang="ko-KR" altLang="en-US"/>
           </a:p>
@@ -698,7 +697,7 @@
           <a:p>
             <a:fld id="{D512FCAD-8E72-4490-9D67-FF3ADE8F49C3}" type="datetimeFigureOut">
               <a:rPr lang="ko-KR" altLang="en-US" smtClean="0"/>
-              <a:t>2021-08-27</a:t>
+              <a:t>2021-08-29</a:t>
             </a:fld>
             <a:endParaRPr lang="ko-KR" altLang="en-US"/>
           </a:p>
@@ -896,7 +895,7 @@
           <a:p>
             <a:fld id="{D512FCAD-8E72-4490-9D67-FF3ADE8F49C3}" type="datetimeFigureOut">
               <a:rPr lang="ko-KR" altLang="en-US" smtClean="0"/>
-              <a:t>2021-08-27</a:t>
+              <a:t>2021-08-29</a:t>
             </a:fld>
             <a:endParaRPr lang="ko-KR" altLang="en-US"/>
           </a:p>
@@ -1171,7 +1170,7 @@
           <a:p>
             <a:fld id="{D512FCAD-8E72-4490-9D67-FF3ADE8F49C3}" type="datetimeFigureOut">
               <a:rPr lang="ko-KR" altLang="en-US" smtClean="0"/>
-              <a:t>2021-08-27</a:t>
+              <a:t>2021-08-29</a:t>
             </a:fld>
             <a:endParaRPr lang="ko-KR" altLang="en-US"/>
           </a:p>
@@ -1436,7 +1435,7 @@
           <a:p>
             <a:fld id="{D512FCAD-8E72-4490-9D67-FF3ADE8F49C3}" type="datetimeFigureOut">
               <a:rPr lang="ko-KR" altLang="en-US" smtClean="0"/>
-              <a:t>2021-08-27</a:t>
+              <a:t>2021-08-29</a:t>
             </a:fld>
             <a:endParaRPr lang="ko-KR" altLang="en-US"/>
           </a:p>
@@ -1848,7 +1847,7 @@
           <a:p>
             <a:fld id="{D512FCAD-8E72-4490-9D67-FF3ADE8F49C3}" type="datetimeFigureOut">
               <a:rPr lang="ko-KR" altLang="en-US" smtClean="0"/>
-              <a:t>2021-08-27</a:t>
+              <a:t>2021-08-29</a:t>
             </a:fld>
             <a:endParaRPr lang="ko-KR" altLang="en-US"/>
           </a:p>
@@ -1989,7 +1988,7 @@
           <a:p>
             <a:fld id="{D512FCAD-8E72-4490-9D67-FF3ADE8F49C3}" type="datetimeFigureOut">
               <a:rPr lang="ko-KR" altLang="en-US" smtClean="0"/>
-              <a:t>2021-08-27</a:t>
+              <a:t>2021-08-29</a:t>
             </a:fld>
             <a:endParaRPr lang="ko-KR" altLang="en-US"/>
           </a:p>
@@ -2102,7 +2101,7 @@
           <a:p>
             <a:fld id="{D512FCAD-8E72-4490-9D67-FF3ADE8F49C3}" type="datetimeFigureOut">
               <a:rPr lang="ko-KR" altLang="en-US" smtClean="0"/>
-              <a:t>2021-08-27</a:t>
+              <a:t>2021-08-29</a:t>
             </a:fld>
             <a:endParaRPr lang="ko-KR" altLang="en-US"/>
           </a:p>
@@ -2413,7 +2412,7 @@
           <a:p>
             <a:fld id="{D512FCAD-8E72-4490-9D67-FF3ADE8F49C3}" type="datetimeFigureOut">
               <a:rPr lang="ko-KR" altLang="en-US" smtClean="0"/>
-              <a:t>2021-08-27</a:t>
+              <a:t>2021-08-29</a:t>
             </a:fld>
             <a:endParaRPr lang="ko-KR" altLang="en-US"/>
           </a:p>
@@ -2701,7 +2700,7 @@
           <a:p>
             <a:fld id="{D512FCAD-8E72-4490-9D67-FF3ADE8F49C3}" type="datetimeFigureOut">
               <a:rPr lang="ko-KR" altLang="en-US" smtClean="0"/>
-              <a:t>2021-08-27</a:t>
+              <a:t>2021-08-29</a:t>
             </a:fld>
             <a:endParaRPr lang="ko-KR" altLang="en-US"/>
           </a:p>
@@ -2942,7 +2941,7 @@
           <a:p>
             <a:fld id="{D512FCAD-8E72-4490-9D67-FF3ADE8F49C3}" type="datetimeFigureOut">
               <a:rPr lang="ko-KR" altLang="en-US" smtClean="0"/>
-              <a:t>2021-08-27</a:t>
+              <a:t>2021-08-29</a:t>
             </a:fld>
             <a:endParaRPr lang="ko-KR" altLang="en-US"/>
           </a:p>
@@ -3464,7 +3463,7 @@
           <a:p>
             <a:r>
               <a:rPr lang="en-US" altLang="ko-KR" dirty="0"/>
-              <a:t>2021. 08. 27</a:t>
+              <a:t>2021. 08. 29</a:t>
             </a:r>
           </a:p>
           <a:p>
@@ -3784,8 +3783,8 @@
         </p:nvSpPr>
         <p:spPr>
           <a:xfrm>
-            <a:off x="770021" y="138820"/>
-            <a:ext cx="7265267" cy="646331"/>
+            <a:off x="806597" y="1613900"/>
+            <a:ext cx="10844629" cy="646331"/>
           </a:xfrm>
           <a:prstGeom prst="rect">
             <a:avLst/>
@@ -3816,7 +3815,7 @@
             </a:r>
             <a:r>
               <a:rPr lang="ko-KR" altLang="en-US" sz="2500" dirty="0"/>
-              <a:t>를 저장한다</a:t>
+              <a:t>를 저장함</a:t>
             </a:r>
             <a:endParaRPr lang="en-US" altLang="ko-KR" sz="2500" dirty="0"/>
           </a:p>
@@ -3844,14 +3843,139 @@
         </p:blipFill>
         <p:spPr>
           <a:xfrm>
-            <a:off x="270386" y="1861502"/>
+            <a:off x="540774" y="2812186"/>
             <a:ext cx="4505325" cy="3419475"/>
           </a:xfrm>
           <a:prstGeom prst="rect">
             <a:avLst/>
           </a:prstGeom>
+          <a:ln>
+            <a:solidFill>
+              <a:schemeClr val="tx1"/>
+            </a:solidFill>
+          </a:ln>
         </p:spPr>
       </p:pic>
+      <p:sp>
+        <p:nvSpPr>
+          <p:cNvPr id="9" name="TextBox 8">
+            <a:extLst>
+              <a:ext uri="{FF2B5EF4-FFF2-40B4-BE49-F238E27FC236}">
+                <a16:creationId xmlns:a16="http://schemas.microsoft.com/office/drawing/2014/main" id="{1E9AB0C5-960E-4681-BA6F-A1E87FAEB553}"/>
+              </a:ext>
+            </a:extLst>
+          </p:cNvPr>
+          <p:cNvSpPr txBox="1"/>
+          <p:nvPr/>
+        </p:nvSpPr>
+        <p:spPr>
+          <a:xfrm>
+            <a:off x="6155101" y="4198759"/>
+            <a:ext cx="5594940" cy="646331"/>
+          </a:xfrm>
+          <a:prstGeom prst="rect">
+            <a:avLst/>
+          </a:prstGeom>
+          <a:noFill/>
+        </p:spPr>
+        <p:txBody>
+          <a:bodyPr wrap="square" rtlCol="0">
+            <a:noAutofit/>
+          </a:bodyPr>
+          <a:lstStyle/>
+          <a:p>
+            <a:r>
+              <a:rPr lang="en-US" altLang="ko-KR" dirty="0" err="1"/>
+              <a:t>color_xpath</a:t>
+            </a:r>
+            <a:r>
+              <a:rPr lang="en-US" altLang="ko-KR" dirty="0"/>
+              <a:t> = '//*[@id="df-product-detail"]/div/div[2]/div/div/div[1]/div[1]/ul/li[1]/ul/li[2]/ul/li/a'</a:t>
+            </a:r>
+          </a:p>
+          <a:p>
+            <a:endParaRPr lang="en-US" altLang="ko-KR" sz="2500" dirty="0"/>
+          </a:p>
+        </p:txBody>
+      </p:sp>
+      <p:sp>
+        <p:nvSpPr>
+          <p:cNvPr id="10" name="제목 1">
+            <a:extLst>
+              <a:ext uri="{FF2B5EF4-FFF2-40B4-BE49-F238E27FC236}">
+                <a16:creationId xmlns:a16="http://schemas.microsoft.com/office/drawing/2014/main" id="{B0BE86E5-B59A-4378-B712-7964A37ADE5B}"/>
+              </a:ext>
+            </a:extLst>
+          </p:cNvPr>
+          <p:cNvSpPr>
+            <a:spLocks noGrp="1"/>
+          </p:cNvSpPr>
+          <p:nvPr>
+            <p:ph type="title"/>
+          </p:nvPr>
+        </p:nvSpPr>
+        <p:spPr>
+          <a:xfrm>
+            <a:off x="720000" y="-36000"/>
+            <a:ext cx="10515600" cy="1325563"/>
+          </a:xfrm>
+        </p:spPr>
+        <p:txBody>
+          <a:bodyPr/>
+          <a:lstStyle/>
+          <a:p>
+            <a:r>
+              <a:rPr lang="ko-KR" altLang="en-US" dirty="0"/>
+              <a:t>구현</a:t>
+            </a:r>
+          </a:p>
+        </p:txBody>
+      </p:sp>
+      <p:cxnSp>
+        <p:nvCxnSpPr>
+          <p:cNvPr id="11" name="직선 연결선 10">
+            <a:extLst>
+              <a:ext uri="{FF2B5EF4-FFF2-40B4-BE49-F238E27FC236}">
+                <a16:creationId xmlns:a16="http://schemas.microsoft.com/office/drawing/2014/main" id="{220DA4AB-B632-435F-8CC9-8ACFBB749FDC}"/>
+              </a:ext>
+            </a:extLst>
+          </p:cNvPr>
+          <p:cNvCxnSpPr>
+            <a:cxnSpLocks/>
+          </p:cNvCxnSpPr>
+          <p:nvPr/>
+        </p:nvCxnSpPr>
+        <p:spPr>
+          <a:xfrm>
+            <a:off x="838200" y="1091953"/>
+            <a:ext cx="10633800" cy="0"/>
+          </a:xfrm>
+          <a:prstGeom prst="line">
+            <a:avLst/>
+          </a:prstGeom>
+          <a:ln w="25400">
+            <a:solidFill>
+              <a:schemeClr val="bg1">
+                <a:lumMod val="85000"/>
+              </a:schemeClr>
+            </a:solidFill>
+          </a:ln>
+        </p:spPr>
+        <p:style>
+          <a:lnRef idx="1">
+            <a:schemeClr val="accent1"/>
+          </a:lnRef>
+          <a:fillRef idx="0">
+            <a:schemeClr val="accent1"/>
+          </a:fillRef>
+          <a:effectRef idx="0">
+            <a:schemeClr val="accent1"/>
+          </a:effectRef>
+          <a:fontRef idx="minor">
+            <a:schemeClr val="tx1"/>
+          </a:fontRef>
+        </p:style>
+      </p:cxnSp>
     </p:spTree>
     <p:extLst>
       <p:ext uri="{BB962C8B-B14F-4D97-AF65-F5344CB8AC3E}">
@@ -4012,12 +4136,17 @@
         </p:blipFill>
         <p:spPr>
           <a:xfrm>
-            <a:off x="1145857" y="1543050"/>
+            <a:off x="450913" y="3015234"/>
             <a:ext cx="4657725" cy="3771900"/>
           </a:xfrm>
           <a:prstGeom prst="rect">
             <a:avLst/>
           </a:prstGeom>
+          <a:ln>
+            <a:solidFill>
+              <a:schemeClr val="tx1"/>
+            </a:solidFill>
+          </a:ln>
         </p:spPr>
       </p:pic>
       <p:sp>
@@ -4034,8 +4163,8 @@
         </p:nvSpPr>
         <p:spPr>
           <a:xfrm>
-            <a:off x="770021" y="138820"/>
-            <a:ext cx="7265267" cy="646331"/>
+            <a:off x="450913" y="1667954"/>
+            <a:ext cx="11200313" cy="646331"/>
           </a:xfrm>
           <a:prstGeom prst="rect">
             <a:avLst/>
@@ -4074,12 +4203,140 @@
             </a:r>
             <a:r>
               <a:rPr lang="ko-KR" altLang="en-US" sz="2500" dirty="0"/>
-              <a:t>를 저장한다</a:t>
+              <a:t>를 저장함</a:t>
             </a:r>
             <a:endParaRPr lang="en-US" altLang="ko-KR" sz="2500" dirty="0"/>
           </a:p>
         </p:txBody>
       </p:sp>
+      <p:sp>
+        <p:nvSpPr>
+          <p:cNvPr id="8" name="TextBox 7">
+            <a:extLst>
+              <a:ext uri="{FF2B5EF4-FFF2-40B4-BE49-F238E27FC236}">
+                <a16:creationId xmlns:a16="http://schemas.microsoft.com/office/drawing/2014/main" id="{000CFFD5-8AFD-4D1F-852F-F64C922F53F0}"/>
+              </a:ext>
+            </a:extLst>
+          </p:cNvPr>
+          <p:cNvSpPr txBox="1"/>
+          <p:nvPr/>
+        </p:nvSpPr>
+        <p:spPr>
+          <a:xfrm>
+            <a:off x="6096001" y="4110887"/>
+            <a:ext cx="5555226" cy="646331"/>
+          </a:xfrm>
+          <a:prstGeom prst="rect">
+            <a:avLst/>
+          </a:prstGeom>
+          <a:noFill/>
+        </p:spPr>
+        <p:txBody>
+          <a:bodyPr wrap="square" rtlCol="0">
+            <a:noAutofit/>
+          </a:bodyPr>
+          <a:lstStyle/>
+          <a:p>
+            <a:r>
+              <a:rPr lang="en-US" altLang="ko-KR" dirty="0"/>
+              <a:t>size = </a:t>
+            </a:r>
+            <a:r>
+              <a:rPr lang="en-US" altLang="ko-KR" i="1" dirty="0" err="1"/>
+              <a:t>self</a:t>
+            </a:r>
+            <a:r>
+              <a:rPr lang="en-US" altLang="ko-KR" dirty="0" err="1"/>
+              <a:t>.driver.find_element_by_xpath</a:t>
+            </a:r>
+            <a:r>
+              <a:rPr lang="en-US" altLang="ko-KR" dirty="0"/>
+              <a:t>('//*[@id="df-product-detail"]/div/div[2]/div/div/div[1]/div[1]/ul/li[2]/ul/li[2]/ul/li[2]/a/span')</a:t>
+            </a:r>
+          </a:p>
+          <a:p>
+            <a:endParaRPr lang="en-US" altLang="ko-KR" sz="2500" dirty="0"/>
+          </a:p>
+        </p:txBody>
+      </p:sp>
+      <p:sp>
+        <p:nvSpPr>
+          <p:cNvPr id="10" name="제목 1">
+            <a:extLst>
+              <a:ext uri="{FF2B5EF4-FFF2-40B4-BE49-F238E27FC236}">
+                <a16:creationId xmlns:a16="http://schemas.microsoft.com/office/drawing/2014/main" id="{E458563C-8315-46BA-8AD4-454FA067D453}"/>
+              </a:ext>
+            </a:extLst>
+          </p:cNvPr>
+          <p:cNvSpPr>
+            <a:spLocks noGrp="1"/>
+          </p:cNvSpPr>
+          <p:nvPr>
+            <p:ph type="title"/>
+          </p:nvPr>
+        </p:nvSpPr>
+        <p:spPr>
+          <a:xfrm>
+            <a:off x="720000" y="-36000"/>
+            <a:ext cx="10515600" cy="1325563"/>
+          </a:xfrm>
+        </p:spPr>
+        <p:txBody>
+          <a:bodyPr/>
+          <a:lstStyle/>
+          <a:p>
+            <a:r>
+              <a:rPr lang="ko-KR" altLang="en-US" dirty="0"/>
+              <a:t>구현</a:t>
+            </a:r>
+          </a:p>
+        </p:txBody>
+      </p:sp>
+      <p:cxnSp>
+        <p:nvCxnSpPr>
+          <p:cNvPr id="11" name="직선 연결선 10">
+            <a:extLst>
+              <a:ext uri="{FF2B5EF4-FFF2-40B4-BE49-F238E27FC236}">
+                <a16:creationId xmlns:a16="http://schemas.microsoft.com/office/drawing/2014/main" id="{3C474736-D4D5-48EC-8673-080361A113F6}"/>
+              </a:ext>
+            </a:extLst>
+          </p:cNvPr>
+          <p:cNvCxnSpPr>
+            <a:cxnSpLocks/>
+          </p:cNvCxnSpPr>
+          <p:nvPr/>
+        </p:nvCxnSpPr>
+        <p:spPr>
+          <a:xfrm>
+            <a:off x="838200" y="1091953"/>
+            <a:ext cx="10633800" cy="0"/>
+          </a:xfrm>
+          <a:prstGeom prst="line">
+            <a:avLst/>
+          </a:prstGeom>
+          <a:ln w="25400">
+            <a:solidFill>
+              <a:schemeClr val="bg1">
+                <a:lumMod val="85000"/>
+              </a:schemeClr>
+            </a:solidFill>
+          </a:ln>
+        </p:spPr>
+        <p:style>
+          <a:lnRef idx="1">
+            <a:schemeClr val="accent1"/>
+          </a:lnRef>
+          <a:fillRef idx="0">
+            <a:schemeClr val="accent1"/>
+          </a:fillRef>
+          <a:effectRef idx="0">
+            <a:schemeClr val="accent1"/>
+          </a:effectRef>
+          <a:fontRef idx="minor">
+            <a:schemeClr val="tx1"/>
+          </a:fontRef>
+        </p:style>
+      </p:cxnSp>
     </p:spTree>
     <p:extLst>
       <p:ext uri="{BB962C8B-B14F-4D97-AF65-F5344CB8AC3E}">
@@ -4220,10 +4477,10 @@
       </p:sp>
       <p:sp>
         <p:nvSpPr>
-          <p:cNvPr id="4" name="TextBox 3">
-            <a:extLst>
-              <a:ext uri="{FF2B5EF4-FFF2-40B4-BE49-F238E27FC236}">
-                <a16:creationId xmlns:a16="http://schemas.microsoft.com/office/drawing/2014/main" id="{E9D7686E-EF97-4235-935F-7AED233D9134}"/>
+          <p:cNvPr id="8" name="TextBox 7">
+            <a:extLst>
+              <a:ext uri="{FF2B5EF4-FFF2-40B4-BE49-F238E27FC236}">
+                <a16:creationId xmlns:a16="http://schemas.microsoft.com/office/drawing/2014/main" id="{02E82A51-869A-49F1-99EC-92329D95E528}"/>
               </a:ext>
             </a:extLst>
           </p:cNvPr>
@@ -4232,7 +4489,7 @@
         </p:nvSpPr>
         <p:spPr>
           <a:xfrm>
-            <a:off x="770021" y="138820"/>
+            <a:off x="838200" y="1613881"/>
             <a:ext cx="7265267" cy="646331"/>
           </a:xfrm>
           <a:prstGeom prst="rect">
@@ -4247,164 +4504,6 @@
           <a:lstStyle/>
           <a:p>
             <a:r>
-              <a:rPr lang="en-US" altLang="ko-KR" sz="2500" dirty="0" err="1"/>
-              <a:t>Seleium</a:t>
-            </a:r>
-            <a:r>
-              <a:rPr lang="en-US" altLang="ko-KR" sz="2500" dirty="0"/>
-              <a:t> </a:t>
-            </a:r>
-            <a:r>
-              <a:rPr lang="ko-KR" altLang="en-US" sz="2500" dirty="0"/>
-              <a:t>클릭 함수를 통해 클릭을 했을 때 품절이라고 확인됨</a:t>
-            </a:r>
-            <a:r>
-              <a:rPr lang="en-US" altLang="ko-KR" sz="2500" dirty="0"/>
-              <a:t>(</a:t>
-            </a:r>
-            <a:r>
-              <a:rPr lang="ko-KR" altLang="en-US" sz="2500" dirty="0"/>
-              <a:t>품절이 아닐 시 사이즈만 출력됨</a:t>
-            </a:r>
-            <a:r>
-              <a:rPr lang="en-US" altLang="ko-KR" sz="2500" dirty="0"/>
-              <a:t>)</a:t>
-            </a:r>
-          </a:p>
-        </p:txBody>
-      </p:sp>
-      <p:grpSp>
-        <p:nvGrpSpPr>
-          <p:cNvPr id="5" name="그룹 4">
-            <a:extLst>
-              <a:ext uri="{FF2B5EF4-FFF2-40B4-BE49-F238E27FC236}">
-                <a16:creationId xmlns:a16="http://schemas.microsoft.com/office/drawing/2014/main" id="{36668AB2-6471-45BA-9504-56E268152AA4}"/>
-              </a:ext>
-            </a:extLst>
-          </p:cNvPr>
-          <p:cNvGrpSpPr/>
-          <p:nvPr/>
-        </p:nvGrpSpPr>
-        <p:grpSpPr>
-          <a:xfrm>
-            <a:off x="540774" y="3730375"/>
-            <a:ext cx="2590800" cy="2181225"/>
-            <a:chOff x="540774" y="1247775"/>
-            <a:chExt cx="2590800" cy="2181225"/>
-          </a:xfrm>
-        </p:grpSpPr>
-        <p:pic>
-          <p:nvPicPr>
-            <p:cNvPr id="2" name="그림 1">
-              <a:extLst>
-                <a:ext uri="{FF2B5EF4-FFF2-40B4-BE49-F238E27FC236}">
-                  <a16:creationId xmlns:a16="http://schemas.microsoft.com/office/drawing/2014/main" id="{B40E69B4-C82A-4B78-AAD7-F8CBD70EB11E}"/>
-                </a:ext>
-              </a:extLst>
-            </p:cNvPr>
-            <p:cNvPicPr>
-              <a:picLocks noChangeAspect="1"/>
-            </p:cNvPicPr>
-            <p:nvPr/>
-          </p:nvPicPr>
-          <p:blipFill>
-            <a:blip r:embed="rId2"/>
-            <a:stretch>
-              <a:fillRect/>
-            </a:stretch>
-          </p:blipFill>
-          <p:spPr>
-            <a:xfrm>
-              <a:off x="540774" y="1247775"/>
-              <a:ext cx="2590800" cy="2181225"/>
-            </a:xfrm>
-            <a:prstGeom prst="rect">
-              <a:avLst/>
-            </a:prstGeom>
-          </p:spPr>
-        </p:pic>
-        <p:sp>
-          <p:nvSpPr>
-            <p:cNvPr id="3" name="직사각형 2">
-              <a:extLst>
-                <a:ext uri="{FF2B5EF4-FFF2-40B4-BE49-F238E27FC236}">
-                  <a16:creationId xmlns:a16="http://schemas.microsoft.com/office/drawing/2014/main" id="{33A4D698-68AB-4CB1-9198-C73AA01C329C}"/>
-                </a:ext>
-              </a:extLst>
-            </p:cNvPr>
-            <p:cNvSpPr/>
-            <p:nvPr/>
-          </p:nvSpPr>
-          <p:spPr>
-            <a:xfrm>
-              <a:off x="1463040" y="2783840"/>
-              <a:ext cx="711200" cy="436880"/>
-            </a:xfrm>
-            <a:prstGeom prst="rect">
-              <a:avLst/>
-            </a:prstGeom>
-            <a:noFill/>
-            <a:ln w="28575">
-              <a:solidFill>
-                <a:srgbClr val="FF0000"/>
-              </a:solidFill>
-            </a:ln>
-          </p:spPr>
-          <p:style>
-            <a:lnRef idx="2">
-              <a:schemeClr val="accent1">
-                <a:shade val="50000"/>
-              </a:schemeClr>
-            </a:lnRef>
-            <a:fillRef idx="1">
-              <a:schemeClr val="accent1"/>
-            </a:fillRef>
-            <a:effectRef idx="0">
-              <a:schemeClr val="accent1"/>
-            </a:effectRef>
-            <a:fontRef idx="minor">
-              <a:schemeClr val="lt1"/>
-            </a:fontRef>
-          </p:style>
-          <p:txBody>
-            <a:bodyPr rtlCol="0" anchor="ctr"/>
-            <a:lstStyle/>
-            <a:p>
-              <a:pPr algn="ctr"/>
-              <a:endParaRPr lang="ko-KR" altLang="en-US"/>
-            </a:p>
-          </p:txBody>
-        </p:sp>
-      </p:grpSp>
-      <p:sp>
-        <p:nvSpPr>
-          <p:cNvPr id="8" name="TextBox 7">
-            <a:extLst>
-              <a:ext uri="{FF2B5EF4-FFF2-40B4-BE49-F238E27FC236}">
-                <a16:creationId xmlns:a16="http://schemas.microsoft.com/office/drawing/2014/main" id="{02E82A51-869A-49F1-99EC-92329D95E528}"/>
-              </a:ext>
-            </a:extLst>
-          </p:cNvPr>
-          <p:cNvSpPr txBox="1"/>
-          <p:nvPr/>
-        </p:nvSpPr>
-        <p:spPr>
-          <a:xfrm>
-            <a:off x="770021" y="1814631"/>
-            <a:ext cx="7265267" cy="646331"/>
-          </a:xfrm>
-          <a:prstGeom prst="rect">
-            <a:avLst/>
-          </a:prstGeom>
-          <a:noFill/>
-        </p:spPr>
-        <p:txBody>
-          <a:bodyPr wrap="square" rtlCol="0">
-            <a:noAutofit/>
-          </a:bodyPr>
-          <a:lstStyle/>
-          <a:p>
-            <a:r>
               <a:rPr lang="ko-KR" altLang="en-US" sz="2500" dirty="0"/>
               <a:t>품절이라고 표시된 태그를 찾아 </a:t>
             </a:r>
@@ -4435,21 +4534,146 @@
           <p:nvPr/>
         </p:nvPicPr>
         <p:blipFill>
-          <a:blip r:embed="rId3"/>
+          <a:blip r:embed="rId2"/>
           <a:stretch>
             <a:fillRect/>
           </a:stretch>
         </p:blipFill>
         <p:spPr>
           <a:xfrm>
-            <a:off x="3471545" y="3014980"/>
+            <a:off x="417449" y="3159000"/>
             <a:ext cx="6305550" cy="3429000"/>
           </a:xfrm>
           <a:prstGeom prst="rect">
             <a:avLst/>
           </a:prstGeom>
+          <a:ln>
+            <a:solidFill>
+              <a:schemeClr val="tx1"/>
+            </a:solidFill>
+          </a:ln>
         </p:spPr>
       </p:pic>
+      <p:sp>
+        <p:nvSpPr>
+          <p:cNvPr id="10" name="TextBox 9">
+            <a:extLst>
+              <a:ext uri="{FF2B5EF4-FFF2-40B4-BE49-F238E27FC236}">
+                <a16:creationId xmlns:a16="http://schemas.microsoft.com/office/drawing/2014/main" id="{A962BE74-C176-4E69-986C-5A0D862A857B}"/>
+              </a:ext>
+            </a:extLst>
+          </p:cNvPr>
+          <p:cNvSpPr txBox="1"/>
+          <p:nvPr/>
+        </p:nvSpPr>
+        <p:spPr>
+          <a:xfrm>
+            <a:off x="7187184" y="3679583"/>
+            <a:ext cx="4368544" cy="646331"/>
+          </a:xfrm>
+          <a:prstGeom prst="rect">
+            <a:avLst/>
+          </a:prstGeom>
+          <a:noFill/>
+        </p:spPr>
+        <p:txBody>
+          <a:bodyPr wrap="square" rtlCol="0">
+            <a:noAutofit/>
+          </a:bodyPr>
+          <a:lstStyle/>
+          <a:p>
+            <a:r>
+              <a:rPr lang="en-US" altLang="ko-KR" dirty="0" err="1"/>
+              <a:t>text_xpath</a:t>
+            </a:r>
+            <a:r>
+              <a:rPr lang="en-US" altLang="ko-KR" dirty="0"/>
+              <a:t> = '//*[@id="df-product-detail"]/div/div[2]/div/div/div[1]/div[1]/ul/li[2]/ul/li[2]/p/span'</a:t>
+            </a:r>
+          </a:p>
+          <a:p>
+            <a:endParaRPr lang="en-US" altLang="ko-KR" sz="2500" dirty="0"/>
+          </a:p>
+        </p:txBody>
+      </p:sp>
+      <p:sp>
+        <p:nvSpPr>
+          <p:cNvPr id="11" name="제목 1">
+            <a:extLst>
+              <a:ext uri="{FF2B5EF4-FFF2-40B4-BE49-F238E27FC236}">
+                <a16:creationId xmlns:a16="http://schemas.microsoft.com/office/drawing/2014/main" id="{34BF0ADF-1DE1-445B-8308-26DCFF9C1906}"/>
+              </a:ext>
+            </a:extLst>
+          </p:cNvPr>
+          <p:cNvSpPr>
+            <a:spLocks noGrp="1"/>
+          </p:cNvSpPr>
+          <p:nvPr>
+            <p:ph type="title"/>
+          </p:nvPr>
+        </p:nvSpPr>
+        <p:spPr>
+          <a:xfrm>
+            <a:off x="720000" y="-36000"/>
+            <a:ext cx="10515600" cy="1325563"/>
+          </a:xfrm>
+        </p:spPr>
+        <p:txBody>
+          <a:bodyPr/>
+          <a:lstStyle/>
+          <a:p>
+            <a:r>
+              <a:rPr lang="ko-KR" altLang="en-US" dirty="0"/>
+              <a:t>구현</a:t>
+            </a:r>
+          </a:p>
+        </p:txBody>
+      </p:sp>
+      <p:cxnSp>
+        <p:nvCxnSpPr>
+          <p:cNvPr id="12" name="직선 연결선 11">
+            <a:extLst>
+              <a:ext uri="{FF2B5EF4-FFF2-40B4-BE49-F238E27FC236}">
+                <a16:creationId xmlns:a16="http://schemas.microsoft.com/office/drawing/2014/main" id="{95BB3CBA-DE9E-4772-A021-7B070F2B1D7F}"/>
+              </a:ext>
+            </a:extLst>
+          </p:cNvPr>
+          <p:cNvCxnSpPr>
+            <a:cxnSpLocks/>
+          </p:cNvCxnSpPr>
+          <p:nvPr/>
+        </p:nvCxnSpPr>
+        <p:spPr>
+          <a:xfrm>
+            <a:off x="838200" y="1091953"/>
+            <a:ext cx="10633800" cy="0"/>
+          </a:xfrm>
+          <a:prstGeom prst="line">
+            <a:avLst/>
+          </a:prstGeom>
+          <a:ln w="25400">
+            <a:solidFill>
+              <a:schemeClr val="bg1">
+                <a:lumMod val="85000"/>
+              </a:schemeClr>
+            </a:solidFill>
+          </a:ln>
+        </p:spPr>
+        <p:style>
+          <a:lnRef idx="1">
+            <a:schemeClr val="accent1"/>
+          </a:lnRef>
+          <a:fillRef idx="0">
+            <a:schemeClr val="accent1"/>
+          </a:fillRef>
+          <a:effectRef idx="0">
+            <a:schemeClr val="accent1"/>
+          </a:effectRef>
+          <a:fontRef idx="minor">
+            <a:schemeClr val="tx1"/>
+          </a:fontRef>
+        </p:style>
+      </p:cxnSp>
     </p:spTree>
     <p:extLst>
       <p:ext uri="{BB962C8B-B14F-4D97-AF65-F5344CB8AC3E}">
@@ -4602,7 +4826,7 @@
         </p:nvSpPr>
         <p:spPr>
           <a:xfrm>
-            <a:off x="770021" y="138820"/>
+            <a:off x="838200" y="1488135"/>
             <a:ext cx="7265267" cy="646331"/>
           </a:xfrm>
           <a:prstGeom prst="rect">
@@ -4617,36 +4841,174 @@
           <a:lstStyle/>
           <a:p>
             <a:r>
-              <a:rPr lang="en-US" altLang="ko-KR" sz="2500" dirty="0" err="1"/>
-              <a:t>Seleium</a:t>
+              <a:rPr lang="ko-KR" altLang="en-US" sz="2500" dirty="0"/>
+              <a:t>코드 작성</a:t>
             </a:r>
             <a:r>
               <a:rPr lang="en-US" altLang="ko-KR" sz="2500" dirty="0"/>
-              <a:t> </a:t>
+              <a:t>:</a:t>
             </a:r>
             <a:r>
               <a:rPr lang="ko-KR" altLang="en-US" sz="2500" dirty="0"/>
-              <a:t>클릭 함수를 통해 클릭을 했을 때 품절이라고 확인됨</a:t>
-            </a:r>
-            <a:r>
-              <a:rPr lang="en-US" altLang="ko-KR" sz="2500" dirty="0"/>
-              <a:t>(</a:t>
-            </a:r>
-            <a:r>
-              <a:rPr lang="ko-KR" altLang="en-US" sz="2500" dirty="0"/>
-              <a:t>품절이 아닐 시 사이즈만 출력됨</a:t>
-            </a:r>
-            <a:r>
-              <a:rPr lang="en-US" altLang="ko-KR" sz="2500" dirty="0"/>
-              <a:t>)</a:t>
-            </a:r>
-          </a:p>
-        </p:txBody>
-      </p:sp>
+              <a:t> 객체 선언</a:t>
+            </a:r>
+            <a:endParaRPr lang="en-US" altLang="ko-KR" sz="2500" dirty="0"/>
+          </a:p>
+        </p:txBody>
+      </p:sp>
+      <p:pic>
+        <p:nvPicPr>
+          <p:cNvPr id="11" name="그림 10">
+            <a:extLst>
+              <a:ext uri="{FF2B5EF4-FFF2-40B4-BE49-F238E27FC236}">
+                <a16:creationId xmlns:a16="http://schemas.microsoft.com/office/drawing/2014/main" id="{5338AEE9-3747-47E4-A38A-2CEC07906E7D}"/>
+              </a:ext>
+            </a:extLst>
+          </p:cNvPr>
+          <p:cNvPicPr>
+            <a:picLocks noChangeAspect="1"/>
+          </p:cNvPicPr>
+          <p:nvPr/>
+        </p:nvPicPr>
+        <p:blipFill>
+          <a:blip r:embed="rId2"/>
+          <a:stretch>
+            <a:fillRect/>
+          </a:stretch>
+        </p:blipFill>
+        <p:spPr>
+          <a:xfrm>
+            <a:off x="1240200" y="2958918"/>
+            <a:ext cx="9829800" cy="3495675"/>
+          </a:xfrm>
+          <a:prstGeom prst="rect">
+            <a:avLst/>
+          </a:prstGeom>
+          <a:ln>
+            <a:solidFill>
+              <a:schemeClr val="tx1"/>
+            </a:solidFill>
+          </a:ln>
+        </p:spPr>
+      </p:pic>
+      <p:sp>
+        <p:nvSpPr>
+          <p:cNvPr id="13" name="TextBox 12">
+            <a:extLst>
+              <a:ext uri="{FF2B5EF4-FFF2-40B4-BE49-F238E27FC236}">
+                <a16:creationId xmlns:a16="http://schemas.microsoft.com/office/drawing/2014/main" id="{521857B1-CB88-40F3-AC8E-135A4DBFDC6E}"/>
+              </a:ext>
+            </a:extLst>
+          </p:cNvPr>
+          <p:cNvSpPr txBox="1"/>
+          <p:nvPr/>
+        </p:nvSpPr>
+        <p:spPr>
+          <a:xfrm>
+            <a:off x="2629646" y="2529276"/>
+            <a:ext cx="7265267" cy="646331"/>
+          </a:xfrm>
+          <a:prstGeom prst="rect">
+            <a:avLst/>
+          </a:prstGeom>
+          <a:noFill/>
+        </p:spPr>
+        <p:txBody>
+          <a:bodyPr wrap="square" rtlCol="0">
+            <a:noAutofit/>
+          </a:bodyPr>
+          <a:lstStyle/>
+          <a:p>
+            <a:pPr algn="ctr"/>
+            <a:r>
+              <a:rPr lang="en-US" altLang="ko-KR" dirty="0"/>
+              <a:t>&lt;shopping_mall_crawling.py&gt;</a:t>
+            </a:r>
+          </a:p>
+        </p:txBody>
+      </p:sp>
+      <p:sp>
+        <p:nvSpPr>
+          <p:cNvPr id="14" name="제목 1">
+            <a:extLst>
+              <a:ext uri="{FF2B5EF4-FFF2-40B4-BE49-F238E27FC236}">
+                <a16:creationId xmlns:a16="http://schemas.microsoft.com/office/drawing/2014/main" id="{388C6275-2D9F-469B-B011-37AFD7B5D3FB}"/>
+              </a:ext>
+            </a:extLst>
+          </p:cNvPr>
+          <p:cNvSpPr>
+            <a:spLocks noGrp="1"/>
+          </p:cNvSpPr>
+          <p:nvPr>
+            <p:ph type="title"/>
+          </p:nvPr>
+        </p:nvSpPr>
+        <p:spPr>
+          <a:xfrm>
+            <a:off x="720000" y="-36000"/>
+            <a:ext cx="10515600" cy="1325563"/>
+          </a:xfrm>
+        </p:spPr>
+        <p:txBody>
+          <a:bodyPr/>
+          <a:lstStyle/>
+          <a:p>
+            <a:r>
+              <a:rPr lang="ko-KR" altLang="en-US" dirty="0"/>
+              <a:t>구현</a:t>
+            </a:r>
+          </a:p>
+        </p:txBody>
+      </p:sp>
+      <p:cxnSp>
+        <p:nvCxnSpPr>
+          <p:cNvPr id="15" name="직선 연결선 14">
+            <a:extLst>
+              <a:ext uri="{FF2B5EF4-FFF2-40B4-BE49-F238E27FC236}">
+                <a16:creationId xmlns:a16="http://schemas.microsoft.com/office/drawing/2014/main" id="{667C8C56-8371-463D-98C4-00825CE9F3F2}"/>
+              </a:ext>
+            </a:extLst>
+          </p:cNvPr>
+          <p:cNvCxnSpPr>
+            <a:cxnSpLocks/>
+          </p:cNvCxnSpPr>
+          <p:nvPr/>
+        </p:nvCxnSpPr>
+        <p:spPr>
+          <a:xfrm>
+            <a:off x="838200" y="1091953"/>
+            <a:ext cx="10633800" cy="0"/>
+          </a:xfrm>
+          <a:prstGeom prst="line">
+            <a:avLst/>
+          </a:prstGeom>
+          <a:ln w="25400">
+            <a:solidFill>
+              <a:schemeClr val="bg1">
+                <a:lumMod val="85000"/>
+              </a:schemeClr>
+            </a:solidFill>
+          </a:ln>
+        </p:spPr>
+        <p:style>
+          <a:lnRef idx="1">
+            <a:schemeClr val="accent1"/>
+          </a:lnRef>
+          <a:fillRef idx="0">
+            <a:schemeClr val="accent1"/>
+          </a:fillRef>
+          <a:effectRef idx="0">
+            <a:schemeClr val="accent1"/>
+          </a:effectRef>
+          <a:fontRef idx="minor">
+            <a:schemeClr val="tx1"/>
+          </a:fontRef>
+        </p:style>
+      </p:cxnSp>
     </p:spTree>
     <p:extLst>
       <p:ext uri="{BB962C8B-B14F-4D97-AF65-F5344CB8AC3E}">
-        <p14:creationId xmlns:p14="http://schemas.microsoft.com/office/powerpoint/2010/main" val="2469857459"/>
+        <p14:creationId xmlns:p14="http://schemas.microsoft.com/office/powerpoint/2010/main" val="1492631325"/>
       </p:ext>
     </p:extLst>
   </p:cSld>
@@ -4781,6 +5143,208 @@
           </a:p>
         </p:txBody>
       </p:sp>
+      <p:pic>
+        <p:nvPicPr>
+          <p:cNvPr id="2" name="그림 1">
+            <a:extLst>
+              <a:ext uri="{FF2B5EF4-FFF2-40B4-BE49-F238E27FC236}">
+                <a16:creationId xmlns:a16="http://schemas.microsoft.com/office/drawing/2014/main" id="{61DA06C6-1210-40BB-8247-36B6B0B7B0B3}"/>
+              </a:ext>
+            </a:extLst>
+          </p:cNvPr>
+          <p:cNvPicPr>
+            <a:picLocks noChangeAspect="1"/>
+          </p:cNvPicPr>
+          <p:nvPr/>
+        </p:nvPicPr>
+        <p:blipFill>
+          <a:blip r:embed="rId2"/>
+          <a:stretch>
+            <a:fillRect/>
+          </a:stretch>
+        </p:blipFill>
+        <p:spPr>
+          <a:xfrm>
+            <a:off x="0" y="3387292"/>
+            <a:ext cx="12192000" cy="2123279"/>
+          </a:xfrm>
+          <a:prstGeom prst="rect">
+            <a:avLst/>
+          </a:prstGeom>
+          <a:ln>
+            <a:solidFill>
+              <a:schemeClr val="tx1"/>
+            </a:solidFill>
+          </a:ln>
+        </p:spPr>
+      </p:pic>
+      <p:sp>
+        <p:nvSpPr>
+          <p:cNvPr id="5" name="TextBox 4">
+            <a:extLst>
+              <a:ext uri="{FF2B5EF4-FFF2-40B4-BE49-F238E27FC236}">
+                <a16:creationId xmlns:a16="http://schemas.microsoft.com/office/drawing/2014/main" id="{3DC296D1-86D5-4A3E-9A04-3B770CCD99BA}"/>
+              </a:ext>
+            </a:extLst>
+          </p:cNvPr>
+          <p:cNvSpPr txBox="1"/>
+          <p:nvPr/>
+        </p:nvSpPr>
+        <p:spPr>
+          <a:xfrm>
+            <a:off x="-881226" y="1394660"/>
+            <a:ext cx="7265267" cy="646331"/>
+          </a:xfrm>
+          <a:prstGeom prst="rect">
+            <a:avLst/>
+          </a:prstGeom>
+          <a:noFill/>
+        </p:spPr>
+        <p:txBody>
+          <a:bodyPr wrap="square" rtlCol="0">
+            <a:noAutofit/>
+          </a:bodyPr>
+          <a:lstStyle/>
+          <a:p>
+            <a:pPr algn="ctr"/>
+            <a:r>
+              <a:rPr lang="ko-KR" altLang="en-US" sz="2500" dirty="0"/>
+              <a:t>코드 작성</a:t>
+            </a:r>
+            <a:r>
+              <a:rPr lang="en-US" altLang="ko-KR" sz="2500" dirty="0"/>
+              <a:t>: </a:t>
+            </a:r>
+            <a:r>
+              <a:rPr lang="en-US" altLang="ko-KR" sz="2500" dirty="0" err="1"/>
+              <a:t>Xpath</a:t>
+            </a:r>
+            <a:r>
+              <a:rPr lang="en-US" altLang="ko-KR" sz="2500" dirty="0"/>
+              <a:t> </a:t>
+            </a:r>
+            <a:r>
+              <a:rPr lang="ko-KR" altLang="en-US" sz="2500" dirty="0"/>
+              <a:t>관련 함수</a:t>
+            </a:r>
+            <a:endParaRPr lang="en-US" altLang="ko-KR" sz="2500" dirty="0"/>
+          </a:p>
+        </p:txBody>
+      </p:sp>
+      <p:sp>
+        <p:nvSpPr>
+          <p:cNvPr id="8" name="TextBox 7">
+            <a:extLst>
+              <a:ext uri="{FF2B5EF4-FFF2-40B4-BE49-F238E27FC236}">
+                <a16:creationId xmlns:a16="http://schemas.microsoft.com/office/drawing/2014/main" id="{40DBE867-59D9-46DA-B641-E84114586815}"/>
+              </a:ext>
+            </a:extLst>
+          </p:cNvPr>
+          <p:cNvSpPr txBox="1"/>
+          <p:nvPr/>
+        </p:nvSpPr>
+        <p:spPr>
+          <a:xfrm>
+            <a:off x="2463366" y="2866517"/>
+            <a:ext cx="7265267" cy="646331"/>
+          </a:xfrm>
+          <a:prstGeom prst="rect">
+            <a:avLst/>
+          </a:prstGeom>
+          <a:noFill/>
+        </p:spPr>
+        <p:txBody>
+          <a:bodyPr wrap="square" rtlCol="0">
+            <a:noAutofit/>
+          </a:bodyPr>
+          <a:lstStyle/>
+          <a:p>
+            <a:pPr algn="ctr"/>
+            <a:r>
+              <a:rPr lang="en-US" altLang="ko-KR" dirty="0"/>
+              <a:t>&lt;shopping_mall_crawling.py&gt;</a:t>
+            </a:r>
+          </a:p>
+        </p:txBody>
+      </p:sp>
+      <p:sp>
+        <p:nvSpPr>
+          <p:cNvPr id="9" name="제목 1">
+            <a:extLst>
+              <a:ext uri="{FF2B5EF4-FFF2-40B4-BE49-F238E27FC236}">
+                <a16:creationId xmlns:a16="http://schemas.microsoft.com/office/drawing/2014/main" id="{BA16F096-DCE8-4F76-989B-8889E6D1CAB1}"/>
+              </a:ext>
+            </a:extLst>
+          </p:cNvPr>
+          <p:cNvSpPr>
+            <a:spLocks noGrp="1"/>
+          </p:cNvSpPr>
+          <p:nvPr>
+            <p:ph type="title"/>
+          </p:nvPr>
+        </p:nvSpPr>
+        <p:spPr>
+          <a:xfrm>
+            <a:off x="720000" y="-36000"/>
+            <a:ext cx="10515600" cy="1325563"/>
+          </a:xfrm>
+        </p:spPr>
+        <p:txBody>
+          <a:bodyPr/>
+          <a:lstStyle/>
+          <a:p>
+            <a:r>
+              <a:rPr lang="ko-KR" altLang="en-US" dirty="0"/>
+              <a:t>구현</a:t>
+            </a:r>
+          </a:p>
+        </p:txBody>
+      </p:sp>
+      <p:cxnSp>
+        <p:nvCxnSpPr>
+          <p:cNvPr id="10" name="직선 연결선 9">
+            <a:extLst>
+              <a:ext uri="{FF2B5EF4-FFF2-40B4-BE49-F238E27FC236}">
+                <a16:creationId xmlns:a16="http://schemas.microsoft.com/office/drawing/2014/main" id="{5394E790-5542-4263-AEF3-CBE46241848B}"/>
+              </a:ext>
+            </a:extLst>
+          </p:cNvPr>
+          <p:cNvCxnSpPr>
+            <a:cxnSpLocks/>
+          </p:cNvCxnSpPr>
+          <p:nvPr/>
+        </p:nvCxnSpPr>
+        <p:spPr>
+          <a:xfrm>
+            <a:off x="838200" y="1091953"/>
+            <a:ext cx="10633800" cy="0"/>
+          </a:xfrm>
+          <a:prstGeom prst="line">
+            <a:avLst/>
+          </a:prstGeom>
+          <a:ln w="25400">
+            <a:solidFill>
+              <a:schemeClr val="bg1">
+                <a:lumMod val="85000"/>
+              </a:schemeClr>
+            </a:solidFill>
+          </a:ln>
+        </p:spPr>
+        <p:style>
+          <a:lnRef idx="1">
+            <a:schemeClr val="accent1"/>
+          </a:lnRef>
+          <a:fillRef idx="0">
+            <a:schemeClr val="accent1"/>
+          </a:fillRef>
+          <a:effectRef idx="0">
+            <a:schemeClr val="accent1"/>
+          </a:effectRef>
+          <a:fontRef idx="minor">
+            <a:schemeClr val="tx1"/>
+          </a:fontRef>
+        </p:style>
+      </p:cxnSp>
     </p:spTree>
     <p:extLst>
       <p:ext uri="{BB962C8B-B14F-4D97-AF65-F5344CB8AC3E}">
@@ -4919,298 +5483,12 @@
           </a:p>
         </p:txBody>
       </p:sp>
-      <p:grpSp>
-        <p:nvGrpSpPr>
-          <p:cNvPr id="2" name="그룹 1">
-            <a:extLst>
-              <a:ext uri="{FF2B5EF4-FFF2-40B4-BE49-F238E27FC236}">
-                <a16:creationId xmlns:a16="http://schemas.microsoft.com/office/drawing/2014/main" id="{48A32594-5260-476E-AA46-F29E937DEDDC}"/>
-              </a:ext>
-            </a:extLst>
-          </p:cNvPr>
-          <p:cNvGrpSpPr/>
-          <p:nvPr/>
-        </p:nvGrpSpPr>
-        <p:grpSpPr>
-          <a:xfrm>
-            <a:off x="1146055" y="540001"/>
-            <a:ext cx="7157651" cy="5218477"/>
-            <a:chOff x="1232370" y="560806"/>
-            <a:chExt cx="7157651" cy="5218477"/>
-          </a:xfrm>
-        </p:grpSpPr>
-        <p:pic>
-          <p:nvPicPr>
-            <p:cNvPr id="8" name="그림 7">
-              <a:extLst>
-                <a:ext uri="{FF2B5EF4-FFF2-40B4-BE49-F238E27FC236}">
-                  <a16:creationId xmlns:a16="http://schemas.microsoft.com/office/drawing/2014/main" id="{56B1787E-9E49-49DA-9244-DC2ACFE2487F}"/>
-                </a:ext>
-              </a:extLst>
-            </p:cNvPr>
-            <p:cNvPicPr>
-              <a:picLocks noChangeAspect="1"/>
-            </p:cNvPicPr>
-            <p:nvPr/>
-          </p:nvPicPr>
-          <p:blipFill>
-            <a:blip r:embed="rId2"/>
-            <a:stretch>
-              <a:fillRect/>
-            </a:stretch>
-          </p:blipFill>
-          <p:spPr>
-            <a:xfrm>
-              <a:off x="1232370" y="560806"/>
-              <a:ext cx="7157651" cy="5218477"/>
-            </a:xfrm>
-            <a:prstGeom prst="rect">
-              <a:avLst/>
-            </a:prstGeom>
-            <a:ln>
-              <a:solidFill>
-                <a:schemeClr val="tx1"/>
-              </a:solidFill>
-            </a:ln>
-          </p:spPr>
-        </p:pic>
-        <p:sp>
-          <p:nvSpPr>
-            <p:cNvPr id="13" name="직사각형 12">
-              <a:extLst>
-                <a:ext uri="{FF2B5EF4-FFF2-40B4-BE49-F238E27FC236}">
-                  <a16:creationId xmlns:a16="http://schemas.microsoft.com/office/drawing/2014/main" id="{99C57D61-D662-4EE0-9EDA-A290EFA803FE}"/>
-                </a:ext>
-              </a:extLst>
-            </p:cNvPr>
-            <p:cNvSpPr/>
-            <p:nvPr/>
-          </p:nvSpPr>
-          <p:spPr>
-            <a:xfrm>
-              <a:off x="5443728" y="3200400"/>
-              <a:ext cx="1847088" cy="157163"/>
-            </a:xfrm>
-            <a:prstGeom prst="rect">
-              <a:avLst/>
-            </a:prstGeom>
-          </p:spPr>
-          <p:style>
-            <a:lnRef idx="2">
-              <a:schemeClr val="accent1">
-                <a:shade val="50000"/>
-              </a:schemeClr>
-            </a:lnRef>
-            <a:fillRef idx="1">
-              <a:schemeClr val="accent1"/>
-            </a:fillRef>
-            <a:effectRef idx="0">
-              <a:schemeClr val="accent1"/>
-            </a:effectRef>
-            <a:fontRef idx="minor">
-              <a:schemeClr val="lt1"/>
-            </a:fontRef>
-          </p:style>
-          <p:txBody>
-            <a:bodyPr rtlCol="0" anchor="ctr"/>
-            <a:lstStyle/>
-            <a:p>
-              <a:pPr algn="ctr"/>
-              <a:endParaRPr lang="ko-KR" altLang="en-US"/>
-            </a:p>
-          </p:txBody>
-        </p:sp>
-        <p:sp>
-          <p:nvSpPr>
-            <p:cNvPr id="21" name="직사각형 20">
-              <a:extLst>
-                <a:ext uri="{FF2B5EF4-FFF2-40B4-BE49-F238E27FC236}">
-                  <a16:creationId xmlns:a16="http://schemas.microsoft.com/office/drawing/2014/main" id="{24EEE911-0D14-49B2-A01C-D5A7FAC08F21}"/>
-                </a:ext>
-              </a:extLst>
-            </p:cNvPr>
-            <p:cNvSpPr/>
-            <p:nvPr/>
-          </p:nvSpPr>
-          <p:spPr>
-            <a:xfrm>
-              <a:off x="5443728" y="3561642"/>
-              <a:ext cx="1901952" cy="157163"/>
-            </a:xfrm>
-            <a:prstGeom prst="rect">
-              <a:avLst/>
-            </a:prstGeom>
-          </p:spPr>
-          <p:style>
-            <a:lnRef idx="2">
-              <a:schemeClr val="accent1">
-                <a:shade val="50000"/>
-              </a:schemeClr>
-            </a:lnRef>
-            <a:fillRef idx="1">
-              <a:schemeClr val="accent1"/>
-            </a:fillRef>
-            <a:effectRef idx="0">
-              <a:schemeClr val="accent1"/>
-            </a:effectRef>
-            <a:fontRef idx="minor">
-              <a:schemeClr val="lt1"/>
-            </a:fontRef>
-          </p:style>
-          <p:txBody>
-            <a:bodyPr rtlCol="0" anchor="ctr"/>
-            <a:lstStyle/>
-            <a:p>
-              <a:pPr algn="ctr"/>
-              <a:endParaRPr lang="ko-KR" altLang="en-US"/>
-            </a:p>
-          </p:txBody>
-        </p:sp>
-        <p:sp>
-          <p:nvSpPr>
-            <p:cNvPr id="22" name="직사각형 21">
-              <a:extLst>
-                <a:ext uri="{FF2B5EF4-FFF2-40B4-BE49-F238E27FC236}">
-                  <a16:creationId xmlns:a16="http://schemas.microsoft.com/office/drawing/2014/main" id="{E9D292D2-D725-49F9-97A5-03647B805FF6}"/>
-                </a:ext>
-              </a:extLst>
-            </p:cNvPr>
-            <p:cNvSpPr/>
-            <p:nvPr/>
-          </p:nvSpPr>
-          <p:spPr>
-            <a:xfrm>
-              <a:off x="5443728" y="3948630"/>
-              <a:ext cx="1901952" cy="157163"/>
-            </a:xfrm>
-            <a:prstGeom prst="rect">
-              <a:avLst/>
-            </a:prstGeom>
-          </p:spPr>
-          <p:style>
-            <a:lnRef idx="2">
-              <a:schemeClr val="accent1">
-                <a:shade val="50000"/>
-              </a:schemeClr>
-            </a:lnRef>
-            <a:fillRef idx="1">
-              <a:schemeClr val="accent1"/>
-            </a:fillRef>
-            <a:effectRef idx="0">
-              <a:schemeClr val="accent1"/>
-            </a:effectRef>
-            <a:fontRef idx="minor">
-              <a:schemeClr val="lt1"/>
-            </a:fontRef>
-          </p:style>
-          <p:txBody>
-            <a:bodyPr rtlCol="0" anchor="ctr"/>
-            <a:lstStyle/>
-            <a:p>
-              <a:pPr algn="ctr"/>
-              <a:endParaRPr lang="ko-KR" altLang="en-US"/>
-            </a:p>
-          </p:txBody>
-        </p:sp>
-        <p:sp>
-          <p:nvSpPr>
-            <p:cNvPr id="23" name="직사각형 22">
-              <a:extLst>
-                <a:ext uri="{FF2B5EF4-FFF2-40B4-BE49-F238E27FC236}">
-                  <a16:creationId xmlns:a16="http://schemas.microsoft.com/office/drawing/2014/main" id="{F000B931-4C0F-43B0-94AB-E2BBDC8C7BD3}"/>
-                </a:ext>
-              </a:extLst>
-            </p:cNvPr>
-            <p:cNvSpPr/>
-            <p:nvPr/>
-          </p:nvSpPr>
-          <p:spPr>
-            <a:xfrm>
-              <a:off x="5449824" y="4309872"/>
-              <a:ext cx="1847088" cy="157163"/>
-            </a:xfrm>
-            <a:prstGeom prst="rect">
-              <a:avLst/>
-            </a:prstGeom>
-          </p:spPr>
-          <p:style>
-            <a:lnRef idx="2">
-              <a:schemeClr val="accent1">
-                <a:shade val="50000"/>
-              </a:schemeClr>
-            </a:lnRef>
-            <a:fillRef idx="1">
-              <a:schemeClr val="accent1"/>
-            </a:fillRef>
-            <a:effectRef idx="0">
-              <a:schemeClr val="accent1"/>
-            </a:effectRef>
-            <a:fontRef idx="minor">
-              <a:schemeClr val="lt1"/>
-            </a:fontRef>
-          </p:style>
-          <p:txBody>
-            <a:bodyPr rtlCol="0" anchor="ctr"/>
-            <a:lstStyle/>
-            <a:p>
-              <a:pPr algn="ctr"/>
-              <a:endParaRPr lang="ko-KR" altLang="en-US"/>
-            </a:p>
-          </p:txBody>
-        </p:sp>
-        <p:sp>
-          <p:nvSpPr>
-            <p:cNvPr id="24" name="직사각형 23">
-              <a:extLst>
-                <a:ext uri="{FF2B5EF4-FFF2-40B4-BE49-F238E27FC236}">
-                  <a16:creationId xmlns:a16="http://schemas.microsoft.com/office/drawing/2014/main" id="{E746B4AB-95F7-4A7D-AFA7-281481030591}"/>
-                </a:ext>
-              </a:extLst>
-            </p:cNvPr>
-            <p:cNvSpPr/>
-            <p:nvPr/>
-          </p:nvSpPr>
-          <p:spPr>
-            <a:xfrm>
-              <a:off x="4084320" y="1909488"/>
-              <a:ext cx="548640" cy="175344"/>
-            </a:xfrm>
-            <a:prstGeom prst="rect">
-              <a:avLst/>
-            </a:prstGeom>
-          </p:spPr>
-          <p:style>
-            <a:lnRef idx="2">
-              <a:schemeClr val="accent1">
-                <a:shade val="50000"/>
-              </a:schemeClr>
-            </a:lnRef>
-            <a:fillRef idx="1">
-              <a:schemeClr val="accent1"/>
-            </a:fillRef>
-            <a:effectRef idx="0">
-              <a:schemeClr val="accent1"/>
-            </a:effectRef>
-            <a:fontRef idx="minor">
-              <a:schemeClr val="lt1"/>
-            </a:fontRef>
-          </p:style>
-          <p:txBody>
-            <a:bodyPr rtlCol="0" anchor="ctr"/>
-            <a:lstStyle/>
-            <a:p>
-              <a:pPr algn="ctr"/>
-              <a:endParaRPr lang="ko-KR" altLang="en-US"/>
-            </a:p>
-          </p:txBody>
-        </p:sp>
-      </p:grpSp>
-      <p:sp>
-        <p:nvSpPr>
-          <p:cNvPr id="25" name="TextBox 24">
-            <a:extLst>
-              <a:ext uri="{FF2B5EF4-FFF2-40B4-BE49-F238E27FC236}">
-                <a16:creationId xmlns:a16="http://schemas.microsoft.com/office/drawing/2014/main" id="{ADEA0D14-7A75-4951-9CD9-E83759E8936C}"/>
+      <p:sp>
+        <p:nvSpPr>
+          <p:cNvPr id="5" name="TextBox 4">
+            <a:extLst>
+              <a:ext uri="{FF2B5EF4-FFF2-40B4-BE49-F238E27FC236}">
+                <a16:creationId xmlns:a16="http://schemas.microsoft.com/office/drawing/2014/main" id="{3DC296D1-86D5-4A3E-9A04-3B770CCD99BA}"/>
               </a:ext>
             </a:extLst>
           </p:cNvPr>
@@ -5219,8 +5497,8 @@
         </p:nvSpPr>
         <p:spPr>
           <a:xfrm>
-            <a:off x="9027828" y="2222027"/>
-            <a:ext cx="2231923" cy="2993556"/>
+            <a:off x="838200" y="1362792"/>
+            <a:ext cx="9622536" cy="646331"/>
           </a:xfrm>
           <a:prstGeom prst="rect">
             <a:avLst/>
@@ -5233,27 +5511,262 @@
           </a:bodyPr>
           <a:lstStyle/>
           <a:p>
+            <a:r>
+              <a:rPr lang="ko-KR" altLang="en-US" sz="2500" dirty="0"/>
+              <a:t>코드 작성</a:t>
+            </a:r>
+            <a:r>
+              <a:rPr lang="en-US" altLang="ko-KR" sz="2500" dirty="0"/>
+              <a:t>: </a:t>
+            </a:r>
+            <a:r>
+              <a:rPr lang="ko-KR" altLang="en-US" sz="2500" dirty="0"/>
+              <a:t>카카오톡 보내기 함수</a:t>
+            </a:r>
+            <a:r>
+              <a:rPr lang="en-US" altLang="ko-KR" sz="2500" dirty="0"/>
+              <a:t>, </a:t>
+            </a:r>
+            <a:r>
+              <a:rPr lang="ko-KR" altLang="en-US" sz="2500" dirty="0"/>
+              <a:t>프로세스 끝내는 함수</a:t>
+            </a:r>
+            <a:r>
+              <a:rPr lang="en-US" altLang="ko-KR" sz="2500" dirty="0"/>
+              <a:t>, </a:t>
+            </a:r>
+            <a:r>
+              <a:rPr lang="ko-KR" altLang="en-US" sz="2500" dirty="0"/>
+              <a:t>재고가 있을 시 보냈던 메시지 체크 함수</a:t>
+            </a:r>
+            <a:endParaRPr lang="en-US" altLang="ko-KR" sz="2500" dirty="0"/>
+          </a:p>
+        </p:txBody>
+      </p:sp>
+      <p:pic>
+        <p:nvPicPr>
+          <p:cNvPr id="3" name="그림 2">
+            <a:extLst>
+              <a:ext uri="{FF2B5EF4-FFF2-40B4-BE49-F238E27FC236}">
+                <a16:creationId xmlns:a16="http://schemas.microsoft.com/office/drawing/2014/main" id="{822F2EDC-4AC2-4101-ACC8-C0D633BB0468}"/>
+              </a:ext>
+            </a:extLst>
+          </p:cNvPr>
+          <p:cNvPicPr>
+            <a:picLocks noChangeAspect="1"/>
+          </p:cNvPicPr>
+          <p:nvPr/>
+        </p:nvPicPr>
+        <p:blipFill>
+          <a:blip r:embed="rId2"/>
+          <a:stretch>
+            <a:fillRect/>
+          </a:stretch>
+        </p:blipFill>
+        <p:spPr>
+          <a:xfrm>
+            <a:off x="1167040" y="3647988"/>
+            <a:ext cx="4124325" cy="2533650"/>
+          </a:xfrm>
+          <a:prstGeom prst="rect">
+            <a:avLst/>
+          </a:prstGeom>
+          <a:ln>
+            <a:solidFill>
+              <a:schemeClr val="tx1"/>
+            </a:solidFill>
+          </a:ln>
+        </p:spPr>
+      </p:pic>
+      <p:sp>
+        <p:nvSpPr>
+          <p:cNvPr id="8" name="TextBox 7">
+            <a:extLst>
+              <a:ext uri="{FF2B5EF4-FFF2-40B4-BE49-F238E27FC236}">
+                <a16:creationId xmlns:a16="http://schemas.microsoft.com/office/drawing/2014/main" id="{BC538616-1878-4845-B021-21AC78582BAF}"/>
+              </a:ext>
+            </a:extLst>
+          </p:cNvPr>
+          <p:cNvSpPr txBox="1"/>
+          <p:nvPr/>
+        </p:nvSpPr>
+        <p:spPr>
+          <a:xfrm>
+            <a:off x="-2391754" y="3210012"/>
+            <a:ext cx="7265267" cy="646331"/>
+          </a:xfrm>
+          <a:prstGeom prst="rect">
+            <a:avLst/>
+          </a:prstGeom>
+          <a:noFill/>
+        </p:spPr>
+        <p:txBody>
+          <a:bodyPr wrap="square" rtlCol="0">
+            <a:noAutofit/>
+          </a:bodyPr>
+          <a:lstStyle/>
+          <a:p>
             <a:pPr algn="r"/>
             <a:r>
-              <a:rPr lang="ko-KR" altLang="en-US" sz="2500" dirty="0"/>
-              <a:t>카카오 개발자 페이지 </a:t>
-            </a:r>
-            <a:r>
-              <a:rPr lang="en-US" altLang="ko-KR" sz="2500" dirty="0"/>
-              <a:t>API Key </a:t>
-            </a:r>
-            <a:r>
-              <a:rPr lang="ko-KR" altLang="en-US" sz="2500" dirty="0"/>
-              <a:t>발급</a:t>
-            </a:r>
-            <a:endParaRPr lang="en-US" altLang="ko-KR" sz="2500" dirty="0"/>
+              <a:rPr lang="en-US" altLang="ko-KR" dirty="0"/>
+              <a:t>&lt;shopping_mall_crawling.py&gt;</a:t>
+            </a:r>
+          </a:p>
+        </p:txBody>
+      </p:sp>
+      <p:sp>
+        <p:nvSpPr>
+          <p:cNvPr id="9" name="제목 1">
+            <a:extLst>
+              <a:ext uri="{FF2B5EF4-FFF2-40B4-BE49-F238E27FC236}">
+                <a16:creationId xmlns:a16="http://schemas.microsoft.com/office/drawing/2014/main" id="{5880B286-7F0A-46BF-B79F-D1BC2EF3CD87}"/>
+              </a:ext>
+            </a:extLst>
+          </p:cNvPr>
+          <p:cNvSpPr>
+            <a:spLocks noGrp="1"/>
+          </p:cNvSpPr>
+          <p:nvPr>
+            <p:ph type="title"/>
+          </p:nvPr>
+        </p:nvSpPr>
+        <p:spPr>
+          <a:xfrm>
+            <a:off x="720000" y="-36000"/>
+            <a:ext cx="10515600" cy="1325563"/>
+          </a:xfrm>
+        </p:spPr>
+        <p:txBody>
+          <a:bodyPr/>
+          <a:lstStyle/>
+          <a:p>
+            <a:r>
+              <a:rPr lang="ko-KR" altLang="en-US" dirty="0"/>
+              <a:t>구현</a:t>
+            </a:r>
+          </a:p>
+        </p:txBody>
+      </p:sp>
+      <p:cxnSp>
+        <p:nvCxnSpPr>
+          <p:cNvPr id="10" name="직선 연결선 9">
+            <a:extLst>
+              <a:ext uri="{FF2B5EF4-FFF2-40B4-BE49-F238E27FC236}">
+                <a16:creationId xmlns:a16="http://schemas.microsoft.com/office/drawing/2014/main" id="{477DD8D7-C4B5-49CF-BE07-3FE553FC6804}"/>
+              </a:ext>
+            </a:extLst>
+          </p:cNvPr>
+          <p:cNvCxnSpPr>
+            <a:cxnSpLocks/>
+          </p:cNvCxnSpPr>
+          <p:nvPr/>
+        </p:nvCxnSpPr>
+        <p:spPr>
+          <a:xfrm>
+            <a:off x="838200" y="1091953"/>
+            <a:ext cx="10633800" cy="0"/>
+          </a:xfrm>
+          <a:prstGeom prst="line">
+            <a:avLst/>
+          </a:prstGeom>
+          <a:ln w="25400">
+            <a:solidFill>
+              <a:schemeClr val="bg1">
+                <a:lumMod val="85000"/>
+              </a:schemeClr>
+            </a:solidFill>
+          </a:ln>
+        </p:spPr>
+        <p:style>
+          <a:lnRef idx="1">
+            <a:schemeClr val="accent1"/>
+          </a:lnRef>
+          <a:fillRef idx="0">
+            <a:schemeClr val="accent1"/>
+          </a:fillRef>
+          <a:effectRef idx="0">
+            <a:schemeClr val="accent1"/>
+          </a:effectRef>
+          <a:fontRef idx="minor">
+            <a:schemeClr val="tx1"/>
+          </a:fontRef>
+        </p:style>
+      </p:cxnSp>
+      <p:pic>
+        <p:nvPicPr>
+          <p:cNvPr id="12" name="그림 11">
+            <a:extLst>
+              <a:ext uri="{FF2B5EF4-FFF2-40B4-BE49-F238E27FC236}">
+                <a16:creationId xmlns:a16="http://schemas.microsoft.com/office/drawing/2014/main" id="{8904F457-397C-43A3-BDE5-75A01BE278EA}"/>
+              </a:ext>
+            </a:extLst>
+          </p:cNvPr>
+          <p:cNvPicPr>
+            <a:picLocks noChangeAspect="1"/>
+          </p:cNvPicPr>
+          <p:nvPr/>
+        </p:nvPicPr>
+        <p:blipFill>
+          <a:blip r:embed="rId3"/>
+          <a:stretch>
+            <a:fillRect/>
+          </a:stretch>
+        </p:blipFill>
+        <p:spPr>
+          <a:xfrm>
+            <a:off x="7568882" y="2927152"/>
+            <a:ext cx="3400425" cy="3819525"/>
+          </a:xfrm>
+          <a:prstGeom prst="rect">
+            <a:avLst/>
+          </a:prstGeom>
+          <a:ln>
+            <a:solidFill>
+              <a:schemeClr val="tx1"/>
+            </a:solidFill>
+          </a:ln>
+        </p:spPr>
+      </p:pic>
+      <p:sp>
+        <p:nvSpPr>
+          <p:cNvPr id="14" name="TextBox 13">
+            <a:extLst>
+              <a:ext uri="{FF2B5EF4-FFF2-40B4-BE49-F238E27FC236}">
+                <a16:creationId xmlns:a16="http://schemas.microsoft.com/office/drawing/2014/main" id="{746312A0-273C-4D40-A6F4-11BBD5C9DEF6}"/>
+              </a:ext>
+            </a:extLst>
+          </p:cNvPr>
+          <p:cNvSpPr txBox="1"/>
+          <p:nvPr/>
+        </p:nvSpPr>
+        <p:spPr>
+          <a:xfrm>
+            <a:off x="3615146" y="2501014"/>
+            <a:ext cx="7265267" cy="646331"/>
+          </a:xfrm>
+          <a:prstGeom prst="rect">
+            <a:avLst/>
+          </a:prstGeom>
+          <a:noFill/>
+        </p:spPr>
+        <p:txBody>
+          <a:bodyPr wrap="square" rtlCol="0">
+            <a:noAutofit/>
+          </a:bodyPr>
+          <a:lstStyle/>
+          <a:p>
+            <a:pPr algn="r"/>
+            <a:r>
+              <a:rPr lang="en-US" altLang="ko-KR" dirty="0"/>
+              <a:t>&lt;shopping_mall_crawling.py&gt;</a:t>
+            </a:r>
           </a:p>
         </p:txBody>
       </p:sp>
     </p:spTree>
     <p:extLst>
       <p:ext uri="{BB962C8B-B14F-4D97-AF65-F5344CB8AC3E}">
-        <p14:creationId xmlns:p14="http://schemas.microsoft.com/office/powerpoint/2010/main" val="1030514992"/>
+        <p14:creationId xmlns:p14="http://schemas.microsoft.com/office/powerpoint/2010/main" val="3531669106"/>
       </p:ext>
     </p:extLst>
   </p:cSld>
@@ -5388,12 +5901,47 @@
           </a:p>
         </p:txBody>
       </p:sp>
-      <p:sp>
-        <p:nvSpPr>
-          <p:cNvPr id="25" name="TextBox 24">
-            <a:extLst>
-              <a:ext uri="{FF2B5EF4-FFF2-40B4-BE49-F238E27FC236}">
-                <a16:creationId xmlns:a16="http://schemas.microsoft.com/office/drawing/2014/main" id="{ADEA0D14-7A75-4951-9CD9-E83759E8936C}"/>
+      <p:pic>
+        <p:nvPicPr>
+          <p:cNvPr id="8" name="그림 7">
+            <a:extLst>
+              <a:ext uri="{FF2B5EF4-FFF2-40B4-BE49-F238E27FC236}">
+                <a16:creationId xmlns:a16="http://schemas.microsoft.com/office/drawing/2014/main" id="{E8760E2B-D2F7-4FF3-9C51-9DCA0F3F64EE}"/>
+              </a:ext>
+            </a:extLst>
+          </p:cNvPr>
+          <p:cNvPicPr>
+            <a:picLocks noChangeAspect="1"/>
+          </p:cNvPicPr>
+          <p:nvPr/>
+        </p:nvPicPr>
+        <p:blipFill>
+          <a:blip r:embed="rId2"/>
+          <a:stretch>
+            <a:fillRect/>
+          </a:stretch>
+        </p:blipFill>
+        <p:spPr>
+          <a:xfrm>
+            <a:off x="7063871" y="3182112"/>
+            <a:ext cx="4533900" cy="2790825"/>
+          </a:xfrm>
+          <a:prstGeom prst="rect">
+            <a:avLst/>
+          </a:prstGeom>
+          <a:ln>
+            <a:solidFill>
+              <a:schemeClr val="tx1"/>
+            </a:solidFill>
+          </a:ln>
+        </p:spPr>
+      </p:pic>
+      <p:sp>
+        <p:nvSpPr>
+          <p:cNvPr id="9" name="TextBox 8">
+            <a:extLst>
+              <a:ext uri="{FF2B5EF4-FFF2-40B4-BE49-F238E27FC236}">
+                <a16:creationId xmlns:a16="http://schemas.microsoft.com/office/drawing/2014/main" id="{908BD9D7-9C4D-4EBC-B24A-54328363F989}"/>
               </a:ext>
             </a:extLst>
           </p:cNvPr>
@@ -5402,8 +5950,8 @@
         </p:nvSpPr>
         <p:spPr>
           <a:xfrm>
-            <a:off x="3636005" y="144980"/>
-            <a:ext cx="4442675" cy="684146"/>
+            <a:off x="8671126" y="2699050"/>
+            <a:ext cx="7265267" cy="646331"/>
           </a:xfrm>
           <a:prstGeom prst="rect">
             <a:avLst/>
@@ -5416,121 +5964,213 @@
           </a:bodyPr>
           <a:lstStyle/>
           <a:p>
-            <a:pPr algn="r"/>
+            <a:r>
+              <a:rPr lang="en-US" altLang="ko-KR" dirty="0"/>
+              <a:t>&lt;main.py&gt;</a:t>
+            </a:r>
+          </a:p>
+        </p:txBody>
+      </p:sp>
+      <p:sp>
+        <p:nvSpPr>
+          <p:cNvPr id="10" name="TextBox 9">
+            <a:extLst>
+              <a:ext uri="{FF2B5EF4-FFF2-40B4-BE49-F238E27FC236}">
+                <a16:creationId xmlns:a16="http://schemas.microsoft.com/office/drawing/2014/main" id="{9B0E8498-07C9-439B-9FA2-82269D7E295F}"/>
+              </a:ext>
+            </a:extLst>
+          </p:cNvPr>
+          <p:cNvSpPr txBox="1"/>
+          <p:nvPr/>
+        </p:nvSpPr>
+        <p:spPr>
+          <a:xfrm>
+            <a:off x="720000" y="1496807"/>
+            <a:ext cx="11085095" cy="646331"/>
+          </a:xfrm>
+          <a:prstGeom prst="rect">
+            <a:avLst/>
+          </a:prstGeom>
+          <a:noFill/>
+        </p:spPr>
+        <p:txBody>
+          <a:bodyPr wrap="square" rtlCol="0">
+            <a:noAutofit/>
+          </a:bodyPr>
+          <a:lstStyle/>
+          <a:p>
             <a:r>
               <a:rPr lang="ko-KR" altLang="en-US" sz="2500" dirty="0"/>
-              <a:t>카카오 로그인 활성화</a:t>
+              <a:t>코드 작성</a:t>
+            </a:r>
+            <a:r>
+              <a:rPr lang="en-US" altLang="ko-KR" sz="2500" dirty="0"/>
+              <a:t>: </a:t>
+            </a:r>
+            <a:r>
+              <a:rPr lang="ko-KR" altLang="en-US" sz="2500" dirty="0"/>
+              <a:t>실행 함수와 </a:t>
+            </a:r>
+            <a:r>
+              <a:rPr lang="ko-KR" altLang="en-US" sz="2500" dirty="0" err="1"/>
+              <a:t>메인함수</a:t>
             </a:r>
             <a:endParaRPr lang="en-US" altLang="ko-KR" sz="2500" dirty="0"/>
           </a:p>
         </p:txBody>
       </p:sp>
-      <p:grpSp>
-        <p:nvGrpSpPr>
-          <p:cNvPr id="3" name="그룹 2">
-            <a:extLst>
-              <a:ext uri="{FF2B5EF4-FFF2-40B4-BE49-F238E27FC236}">
-                <a16:creationId xmlns:a16="http://schemas.microsoft.com/office/drawing/2014/main" id="{20E860F5-1313-426C-8A94-24BFEF0EA7FF}"/>
-              </a:ext>
-            </a:extLst>
-          </p:cNvPr>
-          <p:cNvGrpSpPr/>
-          <p:nvPr/>
-        </p:nvGrpSpPr>
-        <p:grpSpPr>
-          <a:xfrm>
-            <a:off x="395439" y="968939"/>
-            <a:ext cx="9745819" cy="4440512"/>
-            <a:chOff x="395439" y="968939"/>
-            <a:chExt cx="9745819" cy="4440512"/>
-          </a:xfrm>
-        </p:grpSpPr>
-        <p:pic>
-          <p:nvPicPr>
-            <p:cNvPr id="2" name="그림 1">
-              <a:extLst>
-                <a:ext uri="{FF2B5EF4-FFF2-40B4-BE49-F238E27FC236}">
-                  <a16:creationId xmlns:a16="http://schemas.microsoft.com/office/drawing/2014/main" id="{AC987436-18BE-4B6F-89BE-455640C0EFAC}"/>
-                </a:ext>
-              </a:extLst>
-            </p:cNvPr>
-            <p:cNvPicPr>
-              <a:picLocks noChangeAspect="1"/>
-            </p:cNvPicPr>
-            <p:nvPr/>
-          </p:nvPicPr>
-          <p:blipFill>
-            <a:blip r:embed="rId2"/>
-            <a:stretch>
-              <a:fillRect/>
-            </a:stretch>
-          </p:blipFill>
-          <p:spPr>
-            <a:xfrm>
-              <a:off x="395439" y="968939"/>
-              <a:ext cx="9745819" cy="4440512"/>
-            </a:xfrm>
-            <a:prstGeom prst="rect">
-              <a:avLst/>
-            </a:prstGeom>
-            <a:ln>
-              <a:solidFill>
-                <a:schemeClr val="tx1"/>
-              </a:solidFill>
-            </a:ln>
-          </p:spPr>
-        </p:pic>
-        <p:sp>
-          <p:nvSpPr>
-            <p:cNvPr id="12" name="직사각형 11">
-              <a:extLst>
-                <a:ext uri="{FF2B5EF4-FFF2-40B4-BE49-F238E27FC236}">
-                  <a16:creationId xmlns:a16="http://schemas.microsoft.com/office/drawing/2014/main" id="{89C84C68-E2AC-4011-ABAE-C78CEB8DE09B}"/>
-                </a:ext>
-              </a:extLst>
-            </p:cNvPr>
-            <p:cNvSpPr/>
-            <p:nvPr/>
-          </p:nvSpPr>
-          <p:spPr>
-            <a:xfrm>
-              <a:off x="3180278" y="1777802"/>
-              <a:ext cx="548640" cy="175344"/>
-            </a:xfrm>
-            <a:prstGeom prst="rect">
-              <a:avLst/>
-            </a:prstGeom>
-          </p:spPr>
-          <p:style>
-            <a:lnRef idx="2">
-              <a:schemeClr val="accent1">
-                <a:shade val="50000"/>
+      <p:pic>
+        <p:nvPicPr>
+          <p:cNvPr id="11" name="그림 10">
+            <a:extLst>
+              <a:ext uri="{FF2B5EF4-FFF2-40B4-BE49-F238E27FC236}">
+                <a16:creationId xmlns:a16="http://schemas.microsoft.com/office/drawing/2014/main" id="{423043FD-15F3-416F-B5D9-6D0F163A27C9}"/>
+              </a:ext>
+            </a:extLst>
+          </p:cNvPr>
+          <p:cNvPicPr>
+            <a:picLocks noChangeAspect="1"/>
+          </p:cNvPicPr>
+          <p:nvPr/>
+        </p:nvPicPr>
+        <p:blipFill>
+          <a:blip r:embed="rId3"/>
+          <a:stretch>
+            <a:fillRect/>
+          </a:stretch>
+        </p:blipFill>
+        <p:spPr>
+          <a:xfrm>
+            <a:off x="1124328" y="3980457"/>
+            <a:ext cx="4438650" cy="1333500"/>
+          </a:xfrm>
+          <a:prstGeom prst="rect">
+            <a:avLst/>
+          </a:prstGeom>
+          <a:ln>
+            <a:solidFill>
+              <a:schemeClr val="tx1"/>
+            </a:solidFill>
+          </a:ln>
+        </p:spPr>
+      </p:pic>
+      <p:sp>
+        <p:nvSpPr>
+          <p:cNvPr id="12" name="TextBox 11">
+            <a:extLst>
+              <a:ext uri="{FF2B5EF4-FFF2-40B4-BE49-F238E27FC236}">
+                <a16:creationId xmlns:a16="http://schemas.microsoft.com/office/drawing/2014/main" id="{49335905-C56F-47F3-AE43-664D103C0E22}"/>
+              </a:ext>
+            </a:extLst>
+          </p:cNvPr>
+          <p:cNvSpPr txBox="1"/>
+          <p:nvPr/>
+        </p:nvSpPr>
+        <p:spPr>
+          <a:xfrm>
+            <a:off x="1723768" y="3568450"/>
+            <a:ext cx="7265267" cy="646331"/>
+          </a:xfrm>
+          <a:prstGeom prst="rect">
+            <a:avLst/>
+          </a:prstGeom>
+          <a:noFill/>
+        </p:spPr>
+        <p:txBody>
+          <a:bodyPr wrap="square" rtlCol="0">
+            <a:noAutofit/>
+          </a:bodyPr>
+          <a:lstStyle/>
+          <a:p>
+            <a:r>
+              <a:rPr lang="en-US" altLang="ko-KR" dirty="0"/>
+              <a:t>&lt;shopping_mall_crawling.py&gt;</a:t>
+            </a:r>
+          </a:p>
+        </p:txBody>
+      </p:sp>
+      <p:sp>
+        <p:nvSpPr>
+          <p:cNvPr id="13" name="제목 1">
+            <a:extLst>
+              <a:ext uri="{FF2B5EF4-FFF2-40B4-BE49-F238E27FC236}">
+                <a16:creationId xmlns:a16="http://schemas.microsoft.com/office/drawing/2014/main" id="{BEEB7106-8F37-4264-95F9-F08B0EDE25CC}"/>
+              </a:ext>
+            </a:extLst>
+          </p:cNvPr>
+          <p:cNvSpPr>
+            <a:spLocks noGrp="1"/>
+          </p:cNvSpPr>
+          <p:nvPr>
+            <p:ph type="title"/>
+          </p:nvPr>
+        </p:nvSpPr>
+        <p:spPr>
+          <a:xfrm>
+            <a:off x="720000" y="-36000"/>
+            <a:ext cx="10515600" cy="1325563"/>
+          </a:xfrm>
+        </p:spPr>
+        <p:txBody>
+          <a:bodyPr/>
+          <a:lstStyle/>
+          <a:p>
+            <a:r>
+              <a:rPr lang="ko-KR" altLang="en-US" dirty="0"/>
+              <a:t>구현</a:t>
+            </a:r>
+          </a:p>
+        </p:txBody>
+      </p:sp>
+      <p:cxnSp>
+        <p:nvCxnSpPr>
+          <p:cNvPr id="14" name="직선 연결선 13">
+            <a:extLst>
+              <a:ext uri="{FF2B5EF4-FFF2-40B4-BE49-F238E27FC236}">
+                <a16:creationId xmlns:a16="http://schemas.microsoft.com/office/drawing/2014/main" id="{512E024E-93BD-46AB-9C36-A0A524F0F91F}"/>
+              </a:ext>
+            </a:extLst>
+          </p:cNvPr>
+          <p:cNvCxnSpPr>
+            <a:cxnSpLocks/>
+          </p:cNvCxnSpPr>
+          <p:nvPr/>
+        </p:nvCxnSpPr>
+        <p:spPr>
+          <a:xfrm>
+            <a:off x="838200" y="1091953"/>
+            <a:ext cx="10633800" cy="0"/>
+          </a:xfrm>
+          <a:prstGeom prst="line">
+            <a:avLst/>
+          </a:prstGeom>
+          <a:ln w="25400">
+            <a:solidFill>
+              <a:schemeClr val="bg1">
+                <a:lumMod val="85000"/>
               </a:schemeClr>
-            </a:lnRef>
-            <a:fillRef idx="1">
-              <a:schemeClr val="accent1"/>
-            </a:fillRef>
-            <a:effectRef idx="0">
-              <a:schemeClr val="accent1"/>
-            </a:effectRef>
-            <a:fontRef idx="minor">
-              <a:schemeClr val="lt1"/>
-            </a:fontRef>
-          </p:style>
-          <p:txBody>
-            <a:bodyPr rtlCol="0" anchor="ctr"/>
-            <a:lstStyle/>
-            <a:p>
-              <a:pPr algn="ctr"/>
-              <a:endParaRPr lang="ko-KR" altLang="en-US"/>
-            </a:p>
-          </p:txBody>
-        </p:sp>
-      </p:grpSp>
+            </a:solidFill>
+          </a:ln>
+        </p:spPr>
+        <p:style>
+          <a:lnRef idx="1">
+            <a:schemeClr val="accent1"/>
+          </a:lnRef>
+          <a:fillRef idx="0">
+            <a:schemeClr val="accent1"/>
+          </a:fillRef>
+          <a:effectRef idx="0">
+            <a:schemeClr val="accent1"/>
+          </a:effectRef>
+          <a:fontRef idx="minor">
+            <a:schemeClr val="tx1"/>
+          </a:fontRef>
+        </p:style>
+      </p:cxnSp>
     </p:spTree>
     <p:extLst>
       <p:ext uri="{BB962C8B-B14F-4D97-AF65-F5344CB8AC3E}">
-        <p14:creationId xmlns:p14="http://schemas.microsoft.com/office/powerpoint/2010/main" val="111440700"/>
+        <p14:creationId xmlns:p14="http://schemas.microsoft.com/office/powerpoint/2010/main" val="1589013498"/>
       </p:ext>
     </p:extLst>
   </p:cSld>
@@ -5667,10 +6307,10 @@
       </p:sp>
       <p:sp>
         <p:nvSpPr>
-          <p:cNvPr id="25" name="TextBox 24">
-            <a:extLst>
-              <a:ext uri="{FF2B5EF4-FFF2-40B4-BE49-F238E27FC236}">
-                <a16:creationId xmlns:a16="http://schemas.microsoft.com/office/drawing/2014/main" id="{ADEA0D14-7A75-4951-9CD9-E83759E8936C}"/>
+          <p:cNvPr id="4" name="TextBox 3">
+            <a:extLst>
+              <a:ext uri="{FF2B5EF4-FFF2-40B4-BE49-F238E27FC236}">
+                <a16:creationId xmlns:a16="http://schemas.microsoft.com/office/drawing/2014/main" id="{E9D7686E-EF97-4235-935F-7AED233D9134}"/>
               </a:ext>
             </a:extLst>
           </p:cNvPr>
@@ -5679,8 +6319,8 @@
         </p:nvSpPr>
         <p:spPr>
           <a:xfrm>
-            <a:off x="3636005" y="144980"/>
-            <a:ext cx="4442675" cy="684146"/>
+            <a:off x="832164" y="1310672"/>
+            <a:ext cx="7265267" cy="646331"/>
           </a:xfrm>
           <a:prstGeom prst="rect">
             <a:avLst/>
@@ -5693,14 +6333,9 @@
           </a:bodyPr>
           <a:lstStyle/>
           <a:p>
-            <a:pPr algn="r"/>
-            <a:r>
-              <a:rPr lang="en-US" altLang="ko-KR" sz="2500" dirty="0"/>
-              <a:t>Redirect URI </a:t>
-            </a:r>
             <a:r>
               <a:rPr lang="ko-KR" altLang="en-US" sz="2500" dirty="0"/>
-              <a:t>설정</a:t>
+              <a:t>카카오 인증 코드 작성</a:t>
             </a:r>
             <a:endParaRPr lang="en-US" altLang="ko-KR" sz="2500" dirty="0"/>
           </a:p>
@@ -5708,10 +6343,10 @@
       </p:sp>
       <p:pic>
         <p:nvPicPr>
-          <p:cNvPr id="3" name="그림 2">
-            <a:extLst>
-              <a:ext uri="{FF2B5EF4-FFF2-40B4-BE49-F238E27FC236}">
-                <a16:creationId xmlns:a16="http://schemas.microsoft.com/office/drawing/2014/main" id="{F16C9E77-9DBC-4FF6-B35C-3357CA2E0A42}"/>
+          <p:cNvPr id="2" name="그림 1">
+            <a:extLst>
+              <a:ext uri="{FF2B5EF4-FFF2-40B4-BE49-F238E27FC236}">
+                <a16:creationId xmlns:a16="http://schemas.microsoft.com/office/drawing/2014/main" id="{B486C7A3-D28C-4EA1-904A-BA8E00753E8A}"/>
               </a:ext>
             </a:extLst>
           </p:cNvPr>
@@ -5728,8 +6363,8 @@
         </p:blipFill>
         <p:spPr>
           <a:xfrm>
-            <a:off x="2592280" y="1524000"/>
-            <a:ext cx="7315200" cy="3667125"/>
+            <a:off x="2432928" y="2581372"/>
+            <a:ext cx="7089744" cy="4042663"/>
           </a:xfrm>
           <a:prstGeom prst="rect">
             <a:avLst/>
@@ -5741,10 +6376,123 @@
           </a:ln>
         </p:spPr>
       </p:pic>
+      <p:sp>
+        <p:nvSpPr>
+          <p:cNvPr id="8" name="TextBox 7">
+            <a:extLst>
+              <a:ext uri="{FF2B5EF4-FFF2-40B4-BE49-F238E27FC236}">
+                <a16:creationId xmlns:a16="http://schemas.microsoft.com/office/drawing/2014/main" id="{4EE13EF8-BB97-4E8A-BFA3-B67CDCFF6692}"/>
+              </a:ext>
+            </a:extLst>
+          </p:cNvPr>
+          <p:cNvSpPr txBox="1"/>
+          <p:nvPr/>
+        </p:nvSpPr>
+        <p:spPr>
+          <a:xfrm>
+            <a:off x="4305613" y="2094350"/>
+            <a:ext cx="7265267" cy="646331"/>
+          </a:xfrm>
+          <a:prstGeom prst="rect">
+            <a:avLst/>
+          </a:prstGeom>
+          <a:noFill/>
+        </p:spPr>
+        <p:txBody>
+          <a:bodyPr wrap="square" rtlCol="0">
+            <a:noAutofit/>
+          </a:bodyPr>
+          <a:lstStyle/>
+          <a:p>
+            <a:r>
+              <a:rPr lang="en-US" altLang="ko-KR" dirty="0"/>
+              <a:t>&lt;kakao_token_manage.py&gt;</a:t>
+            </a:r>
+          </a:p>
+        </p:txBody>
+      </p:sp>
+      <p:sp>
+        <p:nvSpPr>
+          <p:cNvPr id="9" name="제목 1">
+            <a:extLst>
+              <a:ext uri="{FF2B5EF4-FFF2-40B4-BE49-F238E27FC236}">
+                <a16:creationId xmlns:a16="http://schemas.microsoft.com/office/drawing/2014/main" id="{3178A704-EEB7-4C26-BF30-2EBD4FB63B85}"/>
+              </a:ext>
+            </a:extLst>
+          </p:cNvPr>
+          <p:cNvSpPr>
+            <a:spLocks noGrp="1"/>
+          </p:cNvSpPr>
+          <p:nvPr>
+            <p:ph type="title"/>
+          </p:nvPr>
+        </p:nvSpPr>
+        <p:spPr>
+          <a:xfrm>
+            <a:off x="720000" y="-36000"/>
+            <a:ext cx="10515600" cy="1325563"/>
+          </a:xfrm>
+        </p:spPr>
+        <p:txBody>
+          <a:bodyPr/>
+          <a:lstStyle/>
+          <a:p>
+            <a:r>
+              <a:rPr lang="ko-KR" altLang="en-US" dirty="0"/>
+              <a:t>구현</a:t>
+            </a:r>
+          </a:p>
+        </p:txBody>
+      </p:sp>
+      <p:cxnSp>
+        <p:nvCxnSpPr>
+          <p:cNvPr id="10" name="직선 연결선 9">
+            <a:extLst>
+              <a:ext uri="{FF2B5EF4-FFF2-40B4-BE49-F238E27FC236}">
+                <a16:creationId xmlns:a16="http://schemas.microsoft.com/office/drawing/2014/main" id="{7DE1F548-61C5-45F7-B8AD-B76C64E1F632}"/>
+              </a:ext>
+            </a:extLst>
+          </p:cNvPr>
+          <p:cNvCxnSpPr>
+            <a:cxnSpLocks/>
+          </p:cNvCxnSpPr>
+          <p:nvPr/>
+        </p:nvCxnSpPr>
+        <p:spPr>
+          <a:xfrm>
+            <a:off x="838200" y="1091953"/>
+            <a:ext cx="10633800" cy="0"/>
+          </a:xfrm>
+          <a:prstGeom prst="line">
+            <a:avLst/>
+          </a:prstGeom>
+          <a:ln w="25400">
+            <a:solidFill>
+              <a:schemeClr val="bg1">
+                <a:lumMod val="85000"/>
+              </a:schemeClr>
+            </a:solidFill>
+          </a:ln>
+        </p:spPr>
+        <p:style>
+          <a:lnRef idx="1">
+            <a:schemeClr val="accent1"/>
+          </a:lnRef>
+          <a:fillRef idx="0">
+            <a:schemeClr val="accent1"/>
+          </a:fillRef>
+          <a:effectRef idx="0">
+            <a:schemeClr val="accent1"/>
+          </a:effectRef>
+          <a:fontRef idx="minor">
+            <a:schemeClr val="tx1"/>
+          </a:fontRef>
+        </p:style>
+      </p:cxnSp>
     </p:spTree>
     <p:extLst>
       <p:ext uri="{BB962C8B-B14F-4D97-AF65-F5344CB8AC3E}">
-        <p14:creationId xmlns:p14="http://schemas.microsoft.com/office/powerpoint/2010/main" val="2581569978"/>
+        <p14:creationId xmlns:p14="http://schemas.microsoft.com/office/powerpoint/2010/main" val="3155527843"/>
       </p:ext>
     </p:extLst>
   </p:cSld>
@@ -5893,7 +6641,7 @@
         </p:nvSpPr>
         <p:spPr>
           <a:xfrm>
-            <a:off x="3636005" y="144980"/>
+            <a:off x="-1" y="1267633"/>
             <a:ext cx="4442675" cy="684146"/>
           </a:xfrm>
           <a:prstGeom prst="rect">
@@ -5909,12 +6657,8 @@
           <a:p>
             <a:pPr algn="r"/>
             <a:r>
-              <a:rPr lang="en-US" altLang="ko-KR" sz="2500" dirty="0"/>
-              <a:t>REST API </a:t>
-            </a:r>
-            <a:r>
               <a:rPr lang="ko-KR" altLang="en-US" sz="2500" dirty="0"/>
-              <a:t>클릭 후</a:t>
+              <a:t>메시지 보내기 코드 작성</a:t>
             </a:r>
             <a:endParaRPr lang="en-US" altLang="ko-KR" sz="2500" dirty="0"/>
           </a:p>
@@ -5922,10 +6666,10 @@
       </p:sp>
       <p:pic>
         <p:nvPicPr>
-          <p:cNvPr id="4" name="그림 3">
-            <a:extLst>
-              <a:ext uri="{FF2B5EF4-FFF2-40B4-BE49-F238E27FC236}">
-                <a16:creationId xmlns:a16="http://schemas.microsoft.com/office/drawing/2014/main" id="{FFDA5CD3-3043-4E93-91C2-9F02A1DC4AF4}"/>
+          <p:cNvPr id="2" name="그림 1">
+            <a:extLst>
+              <a:ext uri="{FF2B5EF4-FFF2-40B4-BE49-F238E27FC236}">
+                <a16:creationId xmlns:a16="http://schemas.microsoft.com/office/drawing/2014/main" id="{5421E199-8D3F-461F-A94F-F077FE6C545F}"/>
               </a:ext>
             </a:extLst>
           </p:cNvPr>
@@ -5942,8 +6686,8 @@
         </p:blipFill>
         <p:spPr>
           <a:xfrm>
-            <a:off x="540774" y="923277"/>
-            <a:ext cx="4572000" cy="3886200"/>
+            <a:off x="2401457" y="2593196"/>
+            <a:ext cx="6946730" cy="4072221"/>
           </a:xfrm>
           <a:prstGeom prst="rect">
             <a:avLst/>
@@ -5955,42 +6699,12 @@
           </a:ln>
         </p:spPr>
       </p:pic>
-      <p:pic>
-        <p:nvPicPr>
-          <p:cNvPr id="2" name="그림 1">
-            <a:extLst>
-              <a:ext uri="{FF2B5EF4-FFF2-40B4-BE49-F238E27FC236}">
-                <a16:creationId xmlns:a16="http://schemas.microsoft.com/office/drawing/2014/main" id="{C4D62B40-84AF-422B-BB6E-2CDF914CD0BD}"/>
-              </a:ext>
-            </a:extLst>
-          </p:cNvPr>
-          <p:cNvPicPr>
-            <a:picLocks noChangeAspect="1"/>
-          </p:cNvPicPr>
-          <p:nvPr/>
-        </p:nvPicPr>
-        <p:blipFill>
-          <a:blip r:embed="rId3"/>
-          <a:stretch>
-            <a:fillRect/>
-          </a:stretch>
-        </p:blipFill>
-        <p:spPr>
-          <a:xfrm>
-            <a:off x="791637" y="4179393"/>
-            <a:ext cx="10448925" cy="2638425"/>
-          </a:xfrm>
-          <a:prstGeom prst="rect">
-            <a:avLst/>
-          </a:prstGeom>
-        </p:spPr>
-      </p:pic>
-      <p:sp>
-        <p:nvSpPr>
-          <p:cNvPr id="12" name="TextBox 11">
-            <a:extLst>
-              <a:ext uri="{FF2B5EF4-FFF2-40B4-BE49-F238E27FC236}">
-                <a16:creationId xmlns:a16="http://schemas.microsoft.com/office/drawing/2014/main" id="{CC735736-6913-435E-BCE0-6CF3CABF5A14}"/>
+      <p:sp>
+        <p:nvSpPr>
+          <p:cNvPr id="8" name="TextBox 7">
+            <a:extLst>
+              <a:ext uri="{FF2B5EF4-FFF2-40B4-BE49-F238E27FC236}">
+                <a16:creationId xmlns:a16="http://schemas.microsoft.com/office/drawing/2014/main" id="{EE3D200C-57D8-4D3C-B519-8AB86892FE5D}"/>
               </a:ext>
             </a:extLst>
           </p:cNvPr>
@@ -5999,8 +6713,8 @@
         </p:nvSpPr>
         <p:spPr>
           <a:xfrm>
-            <a:off x="5584054" y="1525116"/>
-            <a:ext cx="6152225" cy="684146"/>
+            <a:off x="4442674" y="2127458"/>
+            <a:ext cx="7265267" cy="646331"/>
           </a:xfrm>
           <a:prstGeom prst="rect">
             <a:avLst/>
@@ -6014,58 +6728,94 @@
           <a:lstStyle/>
           <a:p>
             <a:r>
-              <a:rPr lang="en-US" altLang="ko-KR" sz="1500" dirty="0"/>
-              <a:t>https://kauth.kakao.com/oauth/authorize?client_id={</a:t>
-            </a:r>
-            <a:r>
-              <a:rPr lang="en-US" altLang="ko-KR" sz="1500" dirty="0">
-                <a:solidFill>
-                  <a:srgbClr val="FF0000"/>
-                </a:solidFill>
-              </a:rPr>
-              <a:t>REST_API_KEY</a:t>
-            </a:r>
-            <a:r>
-              <a:rPr lang="en-US" altLang="ko-KR" sz="1500" dirty="0"/>
-              <a:t>}&amp;redirect_uri={</a:t>
-            </a:r>
-            <a:r>
-              <a:rPr lang="en-US" altLang="ko-KR" sz="1500" dirty="0">
-                <a:solidFill>
-                  <a:srgbClr val="FF0000"/>
-                </a:solidFill>
-              </a:rPr>
-              <a:t>REDIRECT_URI</a:t>
-            </a:r>
-            <a:r>
-              <a:rPr lang="en-US" altLang="ko-KR" sz="1500" dirty="0"/>
-              <a:t>}&amp;response_type=code%20HTTP/1.1</a:t>
-            </a:r>
-          </a:p>
-          <a:p>
-            <a:endParaRPr lang="en-US" altLang="ko-KR" sz="1500" dirty="0"/>
-          </a:p>
-          <a:p>
-            <a:r>
-              <a:rPr lang="ko-KR" altLang="en-US" sz="1500" dirty="0"/>
-              <a:t>에서 </a:t>
-            </a:r>
-            <a:r>
-              <a:rPr lang="en-US" altLang="ko-KR" sz="1500" dirty="0"/>
-              <a:t>REST_API_KEY, REDIRECT_URI </a:t>
-            </a:r>
-            <a:r>
-              <a:rPr lang="ko-KR" altLang="en-US" sz="1500"/>
-              <a:t>입력하여 주소 저장하기</a:t>
-            </a:r>
-            <a:endParaRPr lang="en-US" altLang="ko-KR" sz="1500" dirty="0"/>
-          </a:p>
-        </p:txBody>
-      </p:sp>
+              <a:rPr lang="en-US" altLang="ko-KR" dirty="0"/>
+              <a:t>&lt;kakao_token_manage.py&gt;</a:t>
+            </a:r>
+          </a:p>
+        </p:txBody>
+      </p:sp>
+      <p:sp>
+        <p:nvSpPr>
+          <p:cNvPr id="9" name="제목 1">
+            <a:extLst>
+              <a:ext uri="{FF2B5EF4-FFF2-40B4-BE49-F238E27FC236}">
+                <a16:creationId xmlns:a16="http://schemas.microsoft.com/office/drawing/2014/main" id="{561DAF00-0748-46E8-A04B-4EA99A9A2029}"/>
+              </a:ext>
+            </a:extLst>
+          </p:cNvPr>
+          <p:cNvSpPr>
+            <a:spLocks noGrp="1"/>
+          </p:cNvSpPr>
+          <p:nvPr>
+            <p:ph type="title"/>
+          </p:nvPr>
+        </p:nvSpPr>
+        <p:spPr>
+          <a:xfrm>
+            <a:off x="720000" y="-36000"/>
+            <a:ext cx="10515600" cy="1325563"/>
+          </a:xfrm>
+        </p:spPr>
+        <p:txBody>
+          <a:bodyPr/>
+          <a:lstStyle/>
+          <a:p>
+            <a:r>
+              <a:rPr lang="ko-KR" altLang="en-US" dirty="0"/>
+              <a:t>구현</a:t>
+            </a:r>
+          </a:p>
+        </p:txBody>
+      </p:sp>
+      <p:cxnSp>
+        <p:nvCxnSpPr>
+          <p:cNvPr id="10" name="직선 연결선 9">
+            <a:extLst>
+              <a:ext uri="{FF2B5EF4-FFF2-40B4-BE49-F238E27FC236}">
+                <a16:creationId xmlns:a16="http://schemas.microsoft.com/office/drawing/2014/main" id="{308CD285-A050-4B01-B322-112E73902747}"/>
+              </a:ext>
+            </a:extLst>
+          </p:cNvPr>
+          <p:cNvCxnSpPr>
+            <a:cxnSpLocks/>
+          </p:cNvCxnSpPr>
+          <p:nvPr/>
+        </p:nvCxnSpPr>
+        <p:spPr>
+          <a:xfrm>
+            <a:off x="838200" y="1091953"/>
+            <a:ext cx="10633800" cy="0"/>
+          </a:xfrm>
+          <a:prstGeom prst="line">
+            <a:avLst/>
+          </a:prstGeom>
+          <a:ln w="25400">
+            <a:solidFill>
+              <a:schemeClr val="bg1">
+                <a:lumMod val="85000"/>
+              </a:schemeClr>
+            </a:solidFill>
+          </a:ln>
+        </p:spPr>
+        <p:style>
+          <a:lnRef idx="1">
+            <a:schemeClr val="accent1"/>
+          </a:lnRef>
+          <a:fillRef idx="0">
+            <a:schemeClr val="accent1"/>
+          </a:fillRef>
+          <a:effectRef idx="0">
+            <a:schemeClr val="accent1"/>
+          </a:effectRef>
+          <a:fontRef idx="minor">
+            <a:schemeClr val="tx1"/>
+          </a:fontRef>
+        </p:style>
+      </p:cxnSp>
     </p:spTree>
     <p:extLst>
       <p:ext uri="{BB962C8B-B14F-4D97-AF65-F5344CB8AC3E}">
-        <p14:creationId xmlns:p14="http://schemas.microsoft.com/office/powerpoint/2010/main" val="1083475868"/>
+        <p14:creationId xmlns:p14="http://schemas.microsoft.com/office/powerpoint/2010/main" val="458794950"/>
       </p:ext>
     </p:extLst>
   </p:cSld>
@@ -6202,10 +6952,10 @@
       </p:sp>
       <p:sp>
         <p:nvSpPr>
-          <p:cNvPr id="8" name="TextBox 7">
-            <a:extLst>
-              <a:ext uri="{FF2B5EF4-FFF2-40B4-BE49-F238E27FC236}">
-                <a16:creationId xmlns:a16="http://schemas.microsoft.com/office/drawing/2014/main" id="{937FF875-4720-4E89-862A-FE3CABDB6209}"/>
+          <p:cNvPr id="25" name="TextBox 24">
+            <a:extLst>
+              <a:ext uri="{FF2B5EF4-FFF2-40B4-BE49-F238E27FC236}">
+                <a16:creationId xmlns:a16="http://schemas.microsoft.com/office/drawing/2014/main" id="{ADEA0D14-7A75-4951-9CD9-E83759E8936C}"/>
               </a:ext>
             </a:extLst>
           </p:cNvPr>
@@ -6214,7 +6964,7 @@
         </p:nvSpPr>
         <p:spPr>
           <a:xfrm>
-            <a:off x="3636005" y="144980"/>
+            <a:off x="-332758" y="1389886"/>
             <a:ext cx="4442675" cy="684146"/>
           </a:xfrm>
           <a:prstGeom prst="rect">
@@ -6228,170 +6978,253 @@
           </a:bodyPr>
           <a:lstStyle/>
           <a:p>
-            <a:pPr algn="r"/>
-            <a:r>
-              <a:rPr lang="en-US" altLang="ko-KR" sz="2500" dirty="0" err="1"/>
-              <a:t>Access_token</a:t>
-            </a:r>
-            <a:r>
-              <a:rPr lang="en-US" altLang="ko-KR" sz="2500" dirty="0"/>
-              <a:t> </a:t>
-            </a:r>
+            <a:pPr algn="ctr"/>
             <a:r>
               <a:rPr lang="ko-KR" altLang="en-US" sz="2500" dirty="0"/>
-              <a:t>받기</a:t>
+              <a:t>스케줄러 등록</a:t>
             </a:r>
             <a:endParaRPr lang="en-US" altLang="ko-KR" sz="2500" dirty="0"/>
           </a:p>
         </p:txBody>
       </p:sp>
-      <p:grpSp>
-        <p:nvGrpSpPr>
-          <p:cNvPr id="4" name="그룹 3">
-            <a:extLst>
-              <a:ext uri="{FF2B5EF4-FFF2-40B4-BE49-F238E27FC236}">
-                <a16:creationId xmlns:a16="http://schemas.microsoft.com/office/drawing/2014/main" id="{C4A92E00-B05E-432F-A2A2-96F685EB068E}"/>
-              </a:ext>
-            </a:extLst>
-          </p:cNvPr>
-          <p:cNvGrpSpPr/>
-          <p:nvPr/>
-        </p:nvGrpSpPr>
-        <p:grpSpPr>
-          <a:xfrm>
-            <a:off x="1328274" y="1682272"/>
-            <a:ext cx="7458075" cy="3724275"/>
-            <a:chOff x="1328274" y="1682272"/>
-            <a:chExt cx="7458075" cy="3724275"/>
-          </a:xfrm>
-        </p:grpSpPr>
-        <p:pic>
-          <p:nvPicPr>
-            <p:cNvPr id="2" name="그림 1">
-              <a:extLst>
-                <a:ext uri="{FF2B5EF4-FFF2-40B4-BE49-F238E27FC236}">
-                  <a16:creationId xmlns:a16="http://schemas.microsoft.com/office/drawing/2014/main" id="{349ABF67-16AB-4084-9C13-976073FF44FD}"/>
-                </a:ext>
-              </a:extLst>
-            </p:cNvPr>
-            <p:cNvPicPr>
-              <a:picLocks noChangeAspect="1"/>
-            </p:cNvPicPr>
-            <p:nvPr/>
-          </p:nvPicPr>
-          <p:blipFill>
-            <a:blip r:embed="rId2"/>
-            <a:stretch>
-              <a:fillRect/>
-            </a:stretch>
-          </p:blipFill>
-          <p:spPr>
-            <a:xfrm>
-              <a:off x="1328274" y="1682272"/>
-              <a:ext cx="7458075" cy="3724275"/>
-            </a:xfrm>
-            <a:prstGeom prst="rect">
-              <a:avLst/>
-            </a:prstGeom>
-          </p:spPr>
-        </p:pic>
-        <p:sp>
-          <p:nvSpPr>
-            <p:cNvPr id="3" name="직사각형 2">
-              <a:extLst>
-                <a:ext uri="{FF2B5EF4-FFF2-40B4-BE49-F238E27FC236}">
-                  <a16:creationId xmlns:a16="http://schemas.microsoft.com/office/drawing/2014/main" id="{F60A6068-87D2-4AFC-B9E4-691686C9BD89}"/>
-                </a:ext>
-              </a:extLst>
-            </p:cNvPr>
-            <p:cNvSpPr/>
-            <p:nvPr/>
-          </p:nvSpPr>
-          <p:spPr>
-            <a:xfrm>
-              <a:off x="2894120" y="2219417"/>
-              <a:ext cx="2974020" cy="177554"/>
-            </a:xfrm>
-            <a:prstGeom prst="rect">
-              <a:avLst/>
-            </a:prstGeom>
-          </p:spPr>
-          <p:style>
-            <a:lnRef idx="2">
-              <a:schemeClr val="accent1">
-                <a:shade val="50000"/>
+      <p:sp>
+        <p:nvSpPr>
+          <p:cNvPr id="8" name="TextBox 7">
+            <a:extLst>
+              <a:ext uri="{FF2B5EF4-FFF2-40B4-BE49-F238E27FC236}">
+                <a16:creationId xmlns:a16="http://schemas.microsoft.com/office/drawing/2014/main" id="{EE3D200C-57D8-4D3C-B519-8AB86892FE5D}"/>
+              </a:ext>
+            </a:extLst>
+          </p:cNvPr>
+          <p:cNvSpPr txBox="1"/>
+          <p:nvPr/>
+        </p:nvSpPr>
+        <p:spPr>
+          <a:xfrm>
+            <a:off x="2927070" y="2436321"/>
+            <a:ext cx="7265267" cy="646331"/>
+          </a:xfrm>
+          <a:prstGeom prst="rect">
+            <a:avLst/>
+          </a:prstGeom>
+          <a:noFill/>
+        </p:spPr>
+        <p:txBody>
+          <a:bodyPr wrap="square" rtlCol="0">
+            <a:noAutofit/>
+          </a:bodyPr>
+          <a:lstStyle/>
+          <a:p>
+            <a:r>
+              <a:rPr lang="en-US" altLang="ko-KR" dirty="0"/>
+              <a:t>&lt;</a:t>
+            </a:r>
+            <a:r>
+              <a:rPr lang="ko-KR" altLang="en-US" dirty="0"/>
+              <a:t>일반</a:t>
+            </a:r>
+            <a:r>
+              <a:rPr lang="en-US" altLang="ko-KR" dirty="0"/>
+              <a:t>&gt;</a:t>
+            </a:r>
+          </a:p>
+        </p:txBody>
+      </p:sp>
+      <p:pic>
+        <p:nvPicPr>
+          <p:cNvPr id="3" name="그림 2">
+            <a:extLst>
+              <a:ext uri="{FF2B5EF4-FFF2-40B4-BE49-F238E27FC236}">
+                <a16:creationId xmlns:a16="http://schemas.microsoft.com/office/drawing/2014/main" id="{CAE3F736-9456-44D3-BCB4-3130E00224E0}"/>
+              </a:ext>
+            </a:extLst>
+          </p:cNvPr>
+          <p:cNvPicPr>
+            <a:picLocks noChangeAspect="1"/>
+          </p:cNvPicPr>
+          <p:nvPr/>
+        </p:nvPicPr>
+        <p:blipFill>
+          <a:blip r:embed="rId2"/>
+          <a:stretch>
+            <a:fillRect/>
+          </a:stretch>
+        </p:blipFill>
+        <p:spPr>
+          <a:xfrm>
+            <a:off x="1165556" y="2885043"/>
+            <a:ext cx="4677793" cy="3634239"/>
+          </a:xfrm>
+          <a:prstGeom prst="rect">
+            <a:avLst/>
+          </a:prstGeom>
+          <a:ln>
+            <a:solidFill>
+              <a:schemeClr val="tx1"/>
+            </a:solidFill>
+          </a:ln>
+        </p:spPr>
+      </p:pic>
+      <p:sp>
+        <p:nvSpPr>
+          <p:cNvPr id="9" name="제목 1">
+            <a:extLst>
+              <a:ext uri="{FF2B5EF4-FFF2-40B4-BE49-F238E27FC236}">
+                <a16:creationId xmlns:a16="http://schemas.microsoft.com/office/drawing/2014/main" id="{A1A17C21-D678-4B05-B141-8EF91BB05CF2}"/>
+              </a:ext>
+            </a:extLst>
+          </p:cNvPr>
+          <p:cNvSpPr>
+            <a:spLocks noGrp="1"/>
+          </p:cNvSpPr>
+          <p:nvPr>
+            <p:ph type="title"/>
+          </p:nvPr>
+        </p:nvSpPr>
+        <p:spPr>
+          <a:xfrm>
+            <a:off x="720000" y="-36000"/>
+            <a:ext cx="10515600" cy="1325563"/>
+          </a:xfrm>
+        </p:spPr>
+        <p:txBody>
+          <a:bodyPr/>
+          <a:lstStyle/>
+          <a:p>
+            <a:r>
+              <a:rPr lang="ko-KR" altLang="en-US" dirty="0"/>
+              <a:t>구현</a:t>
+            </a:r>
+          </a:p>
+        </p:txBody>
+      </p:sp>
+      <p:cxnSp>
+        <p:nvCxnSpPr>
+          <p:cNvPr id="10" name="직선 연결선 9">
+            <a:extLst>
+              <a:ext uri="{FF2B5EF4-FFF2-40B4-BE49-F238E27FC236}">
+                <a16:creationId xmlns:a16="http://schemas.microsoft.com/office/drawing/2014/main" id="{48FD3DA9-EF32-45CA-A932-259C582FF4E5}"/>
+              </a:ext>
+            </a:extLst>
+          </p:cNvPr>
+          <p:cNvCxnSpPr>
+            <a:cxnSpLocks/>
+          </p:cNvCxnSpPr>
+          <p:nvPr/>
+        </p:nvCxnSpPr>
+        <p:spPr>
+          <a:xfrm>
+            <a:off x="838200" y="1091953"/>
+            <a:ext cx="10633800" cy="0"/>
+          </a:xfrm>
+          <a:prstGeom prst="line">
+            <a:avLst/>
+          </a:prstGeom>
+          <a:ln w="25400">
+            <a:solidFill>
+              <a:schemeClr val="bg1">
+                <a:lumMod val="85000"/>
               </a:schemeClr>
-            </a:lnRef>
-            <a:fillRef idx="1">
-              <a:schemeClr val="accent1"/>
-            </a:fillRef>
-            <a:effectRef idx="0">
-              <a:schemeClr val="accent1"/>
-            </a:effectRef>
-            <a:fontRef idx="minor">
-              <a:schemeClr val="lt1"/>
-            </a:fontRef>
-          </p:style>
-          <p:txBody>
-            <a:bodyPr rtlCol="0" anchor="ctr"/>
-            <a:lstStyle/>
-            <a:p>
-              <a:pPr algn="ctr"/>
-              <a:endParaRPr lang="ko-KR" altLang="en-US"/>
-            </a:p>
-          </p:txBody>
-        </p:sp>
-        <p:sp>
-          <p:nvSpPr>
-            <p:cNvPr id="9" name="직사각형 8">
-              <a:extLst>
-                <a:ext uri="{FF2B5EF4-FFF2-40B4-BE49-F238E27FC236}">
-                  <a16:creationId xmlns:a16="http://schemas.microsoft.com/office/drawing/2014/main" id="{89F4F54B-EBD1-4FE3-878D-39FF70CD7C00}"/>
-                </a:ext>
-              </a:extLst>
-            </p:cNvPr>
-            <p:cNvSpPr/>
-            <p:nvPr/>
-          </p:nvSpPr>
-          <p:spPr>
-            <a:xfrm>
-              <a:off x="2148995" y="2460594"/>
-              <a:ext cx="6637354" cy="177554"/>
-            </a:xfrm>
-            <a:prstGeom prst="rect">
-              <a:avLst/>
-            </a:prstGeom>
-          </p:spPr>
-          <p:style>
-            <a:lnRef idx="2">
-              <a:schemeClr val="accent1">
-                <a:shade val="50000"/>
-              </a:schemeClr>
-            </a:lnRef>
-            <a:fillRef idx="1">
-              <a:schemeClr val="accent1"/>
-            </a:fillRef>
-            <a:effectRef idx="0">
-              <a:schemeClr val="accent1"/>
-            </a:effectRef>
-            <a:fontRef idx="minor">
-              <a:schemeClr val="lt1"/>
-            </a:fontRef>
-          </p:style>
-          <p:txBody>
-            <a:bodyPr rtlCol="0" anchor="ctr"/>
-            <a:lstStyle/>
-            <a:p>
-              <a:pPr algn="ctr"/>
-              <a:endParaRPr lang="ko-KR" altLang="en-US"/>
-            </a:p>
-          </p:txBody>
-        </p:sp>
-      </p:grpSp>
+            </a:solidFill>
+          </a:ln>
+        </p:spPr>
+        <p:style>
+          <a:lnRef idx="1">
+            <a:schemeClr val="accent1"/>
+          </a:lnRef>
+          <a:fillRef idx="0">
+            <a:schemeClr val="accent1"/>
+          </a:fillRef>
+          <a:effectRef idx="0">
+            <a:schemeClr val="accent1"/>
+          </a:effectRef>
+          <a:fontRef idx="minor">
+            <a:schemeClr val="tx1"/>
+          </a:fontRef>
+        </p:style>
+      </p:cxnSp>
+      <p:sp>
+        <p:nvSpPr>
+          <p:cNvPr id="11" name="TextBox 10">
+            <a:extLst>
+              <a:ext uri="{FF2B5EF4-FFF2-40B4-BE49-F238E27FC236}">
+                <a16:creationId xmlns:a16="http://schemas.microsoft.com/office/drawing/2014/main" id="{316B5B75-499C-4921-965C-181D3B2BB461}"/>
+              </a:ext>
+            </a:extLst>
+          </p:cNvPr>
+          <p:cNvSpPr txBox="1"/>
+          <p:nvPr/>
+        </p:nvSpPr>
+        <p:spPr>
+          <a:xfrm>
+            <a:off x="8376486" y="2462232"/>
+            <a:ext cx="7265267" cy="646331"/>
+          </a:xfrm>
+          <a:prstGeom prst="rect">
+            <a:avLst/>
+          </a:prstGeom>
+          <a:noFill/>
+        </p:spPr>
+        <p:txBody>
+          <a:bodyPr wrap="square" rtlCol="0">
+            <a:noAutofit/>
+          </a:bodyPr>
+          <a:lstStyle/>
+          <a:p>
+            <a:r>
+              <a:rPr lang="en-US" altLang="ko-KR" dirty="0"/>
+              <a:t>&lt;</a:t>
+            </a:r>
+            <a:r>
+              <a:rPr lang="ko-KR" altLang="en-US" dirty="0"/>
+              <a:t>트리거</a:t>
+            </a:r>
+            <a:r>
+              <a:rPr lang="en-US" altLang="ko-KR" dirty="0"/>
+              <a:t>&gt;</a:t>
+            </a:r>
+          </a:p>
+        </p:txBody>
+      </p:sp>
+      <p:pic>
+        <p:nvPicPr>
+          <p:cNvPr id="12" name="그림 11">
+            <a:extLst>
+              <a:ext uri="{FF2B5EF4-FFF2-40B4-BE49-F238E27FC236}">
+                <a16:creationId xmlns:a16="http://schemas.microsoft.com/office/drawing/2014/main" id="{462BAF34-9CFC-4933-A7D7-D8F3FBC2E116}"/>
+              </a:ext>
+            </a:extLst>
+          </p:cNvPr>
+          <p:cNvPicPr>
+            <a:picLocks noChangeAspect="1"/>
+          </p:cNvPicPr>
+          <p:nvPr/>
+        </p:nvPicPr>
+        <p:blipFill>
+          <a:blip r:embed="rId3"/>
+          <a:stretch>
+            <a:fillRect/>
+          </a:stretch>
+        </p:blipFill>
+        <p:spPr>
+          <a:xfrm>
+            <a:off x="6762560" y="2885043"/>
+            <a:ext cx="4343405" cy="3702957"/>
+          </a:xfrm>
+          <a:prstGeom prst="rect">
+            <a:avLst/>
+          </a:prstGeom>
+          <a:ln>
+            <a:solidFill>
+              <a:schemeClr val="tx1"/>
+            </a:solidFill>
+          </a:ln>
+        </p:spPr>
+      </p:pic>
     </p:spTree>
     <p:extLst>
       <p:ext uri="{BB962C8B-B14F-4D97-AF65-F5344CB8AC3E}">
-        <p14:creationId xmlns:p14="http://schemas.microsoft.com/office/powerpoint/2010/main" val="1563180382"/>
+        <p14:creationId xmlns:p14="http://schemas.microsoft.com/office/powerpoint/2010/main" val="353606220"/>
       </p:ext>
     </p:extLst>
   </p:cSld>
@@ -6850,10 +7683,10 @@
       </p:sp>
       <p:sp>
         <p:nvSpPr>
-          <p:cNvPr id="25" name="TextBox 24">
-            <a:extLst>
-              <a:ext uri="{FF2B5EF4-FFF2-40B4-BE49-F238E27FC236}">
-                <a16:creationId xmlns:a16="http://schemas.microsoft.com/office/drawing/2014/main" id="{ADEA0D14-7A75-4951-9CD9-E83759E8936C}"/>
+          <p:cNvPr id="8" name="TextBox 7">
+            <a:extLst>
+              <a:ext uri="{FF2B5EF4-FFF2-40B4-BE49-F238E27FC236}">
+                <a16:creationId xmlns:a16="http://schemas.microsoft.com/office/drawing/2014/main" id="{EE3D200C-57D8-4D3C-B519-8AB86892FE5D}"/>
               </a:ext>
             </a:extLst>
           </p:cNvPr>
@@ -6862,8 +7695,8 @@
         </p:nvSpPr>
         <p:spPr>
           <a:xfrm>
-            <a:off x="3636005" y="144980"/>
-            <a:ext cx="4442675" cy="684146"/>
+            <a:off x="2605200" y="2141943"/>
+            <a:ext cx="7265267" cy="646331"/>
           </a:xfrm>
           <a:prstGeom prst="rect">
             <a:avLst/>
@@ -6876,18 +7709,53 @@
           </a:bodyPr>
           <a:lstStyle/>
           <a:p>
-            <a:pPr algn="r"/>
+            <a:r>
+              <a:rPr lang="en-US" altLang="ko-KR" dirty="0"/>
+              <a:t>&lt;</a:t>
+            </a:r>
+            <a:r>
+              <a:rPr lang="ko-KR" altLang="en-US" dirty="0"/>
+              <a:t>동작</a:t>
+            </a:r>
+            <a:r>
+              <a:rPr lang="en-US" altLang="ko-KR" dirty="0"/>
+              <a:t>&gt;</a:t>
+            </a:r>
+          </a:p>
+        </p:txBody>
+      </p:sp>
+      <p:sp>
+        <p:nvSpPr>
+          <p:cNvPr id="9" name="TextBox 8">
+            <a:extLst>
+              <a:ext uri="{FF2B5EF4-FFF2-40B4-BE49-F238E27FC236}">
+                <a16:creationId xmlns:a16="http://schemas.microsoft.com/office/drawing/2014/main" id="{324E4262-D1A9-45DE-A209-2FCE9A99460B}"/>
+              </a:ext>
+            </a:extLst>
+          </p:cNvPr>
+          <p:cNvSpPr txBox="1"/>
+          <p:nvPr/>
+        </p:nvSpPr>
+        <p:spPr>
+          <a:xfrm>
+            <a:off x="-272640" y="1373680"/>
+            <a:ext cx="4442675" cy="684146"/>
+          </a:xfrm>
+          <a:prstGeom prst="rect">
+            <a:avLst/>
+          </a:prstGeom>
+          <a:noFill/>
+        </p:spPr>
+        <p:txBody>
+          <a:bodyPr wrap="square" rtlCol="0">
+            <a:noAutofit/>
+          </a:bodyPr>
+          <a:lstStyle/>
+          <a:p>
+            <a:pPr algn="ctr"/>
             <a:r>
               <a:rPr lang="ko-KR" altLang="en-US" sz="2500" dirty="0"/>
-              <a:t>받은 </a:t>
-            </a:r>
-            <a:r>
-              <a:rPr lang="ko-KR" altLang="en-US" sz="2500" dirty="0" err="1"/>
-              <a:t>엑세스</a:t>
-            </a:r>
-            <a:r>
-              <a:rPr lang="ko-KR" altLang="en-US" sz="2500" dirty="0"/>
-              <a:t> 토큰으로 카카오 보내기</a:t>
+              <a:t>스케줄러 등록</a:t>
             </a:r>
             <a:endParaRPr lang="en-US" altLang="ko-KR" sz="2500" dirty="0"/>
           </a:p>
@@ -6898,7 +7766,7 @@
           <p:cNvPr id="2" name="그림 1">
             <a:extLst>
               <a:ext uri="{FF2B5EF4-FFF2-40B4-BE49-F238E27FC236}">
-                <a16:creationId xmlns:a16="http://schemas.microsoft.com/office/drawing/2014/main" id="{76A7F631-39AC-4EE5-AD54-9B62DCA9AFC7}"/>
+                <a16:creationId xmlns:a16="http://schemas.microsoft.com/office/drawing/2014/main" id="{35BA4130-DB42-46C7-B610-E6AC8EB3DFB8}"/>
               </a:ext>
             </a:extLst>
           </p:cNvPr>
@@ -6915,64 +7783,211 @@
         </p:blipFill>
         <p:spPr>
           <a:xfrm>
-            <a:off x="2728912" y="1014412"/>
-            <a:ext cx="6734175" cy="4829175"/>
+            <a:off x="720000" y="2610527"/>
+            <a:ext cx="4928553" cy="3975657"/>
           </a:xfrm>
           <a:prstGeom prst="rect">
             <a:avLst/>
           </a:prstGeom>
+          <a:ln>
+            <a:solidFill>
+              <a:schemeClr val="tx1"/>
+            </a:solidFill>
+          </a:ln>
         </p:spPr>
       </p:pic>
       <p:sp>
         <p:nvSpPr>
-          <p:cNvPr id="3" name="직사각형 2">
-            <a:extLst>
-              <a:ext uri="{FF2B5EF4-FFF2-40B4-BE49-F238E27FC236}">
-                <a16:creationId xmlns:a16="http://schemas.microsoft.com/office/drawing/2014/main" id="{AF77C051-ED3A-49C2-880C-CFEB611BC68F}"/>
-              </a:ext>
-            </a:extLst>
-          </p:cNvPr>
-          <p:cNvSpPr/>
-          <p:nvPr/>
-        </p:nvSpPr>
-        <p:spPr>
-          <a:xfrm>
-            <a:off x="4323425" y="1740023"/>
-            <a:ext cx="4998128" cy="213064"/>
+          <p:cNvPr id="10" name="제목 1">
+            <a:extLst>
+              <a:ext uri="{FF2B5EF4-FFF2-40B4-BE49-F238E27FC236}">
+                <a16:creationId xmlns:a16="http://schemas.microsoft.com/office/drawing/2014/main" id="{CCB11A1C-A9AD-414D-92AC-CD6C9B672705}"/>
+              </a:ext>
+            </a:extLst>
+          </p:cNvPr>
+          <p:cNvSpPr>
+            <a:spLocks noGrp="1"/>
+          </p:cNvSpPr>
+          <p:nvPr>
+            <p:ph type="title"/>
+          </p:nvPr>
+        </p:nvSpPr>
+        <p:spPr>
+          <a:xfrm>
+            <a:off x="720000" y="-36000"/>
+            <a:ext cx="10515600" cy="1325563"/>
+          </a:xfrm>
+        </p:spPr>
+        <p:txBody>
+          <a:bodyPr/>
+          <a:lstStyle/>
+          <a:p>
+            <a:r>
+              <a:rPr lang="ko-KR" altLang="en-US" dirty="0"/>
+              <a:t>구현</a:t>
+            </a:r>
+          </a:p>
+        </p:txBody>
+      </p:sp>
+      <p:cxnSp>
+        <p:nvCxnSpPr>
+          <p:cNvPr id="11" name="직선 연결선 10">
+            <a:extLst>
+              <a:ext uri="{FF2B5EF4-FFF2-40B4-BE49-F238E27FC236}">
+                <a16:creationId xmlns:a16="http://schemas.microsoft.com/office/drawing/2014/main" id="{318CB822-DC3A-435F-A1C5-488762913EDC}"/>
+              </a:ext>
+            </a:extLst>
+          </p:cNvPr>
+          <p:cNvCxnSpPr>
+            <a:cxnSpLocks/>
+          </p:cNvCxnSpPr>
+          <p:nvPr/>
+        </p:nvCxnSpPr>
+        <p:spPr>
+          <a:xfrm>
+            <a:off x="838200" y="1091953"/>
+            <a:ext cx="10633800" cy="0"/>
+          </a:xfrm>
+          <a:prstGeom prst="line">
+            <a:avLst/>
+          </a:prstGeom>
+          <a:ln w="25400">
+            <a:solidFill>
+              <a:schemeClr val="bg1">
+                <a:lumMod val="85000"/>
+              </a:schemeClr>
+            </a:solidFill>
+          </a:ln>
+        </p:spPr>
+        <p:style>
+          <a:lnRef idx="1">
+            <a:schemeClr val="accent1"/>
+          </a:lnRef>
+          <a:fillRef idx="0">
+            <a:schemeClr val="accent1"/>
+          </a:fillRef>
+          <a:effectRef idx="0">
+            <a:schemeClr val="accent1"/>
+          </a:effectRef>
+          <a:fontRef idx="minor">
+            <a:schemeClr val="tx1"/>
+          </a:fontRef>
+        </p:style>
+      </p:cxnSp>
+      <p:pic>
+        <p:nvPicPr>
+          <p:cNvPr id="12" name="그림 11">
+            <a:extLst>
+              <a:ext uri="{FF2B5EF4-FFF2-40B4-BE49-F238E27FC236}">
+                <a16:creationId xmlns:a16="http://schemas.microsoft.com/office/drawing/2014/main" id="{455530A2-5AA4-4BA1-90E5-AAD9B6A65506}"/>
+              </a:ext>
+            </a:extLst>
+          </p:cNvPr>
+          <p:cNvPicPr>
+            <a:picLocks noChangeAspect="1"/>
+          </p:cNvPicPr>
+          <p:nvPr/>
+        </p:nvPicPr>
+        <p:blipFill>
+          <a:blip r:embed="rId3"/>
+          <a:stretch>
+            <a:fillRect/>
+          </a:stretch>
+        </p:blipFill>
+        <p:spPr>
+          <a:xfrm>
+            <a:off x="7351712" y="2686435"/>
+            <a:ext cx="3381375" cy="3286125"/>
           </a:xfrm>
           <a:prstGeom prst="rect">
             <a:avLst/>
           </a:prstGeom>
         </p:spPr>
-        <p:style>
-          <a:lnRef idx="2">
-            <a:schemeClr val="accent1">
-              <a:shade val="50000"/>
-            </a:schemeClr>
-          </a:lnRef>
-          <a:fillRef idx="1">
-            <a:schemeClr val="accent1"/>
-          </a:fillRef>
-          <a:effectRef idx="0">
-            <a:schemeClr val="accent1"/>
-          </a:effectRef>
-          <a:fontRef idx="minor">
-            <a:schemeClr val="lt1"/>
-          </a:fontRef>
-        </p:style>
-        <p:txBody>
-          <a:bodyPr rtlCol="0" anchor="ctr"/>
+      </p:pic>
+      <p:sp>
+        <p:nvSpPr>
+          <p:cNvPr id="13" name="TextBox 12">
+            <a:extLst>
+              <a:ext uri="{FF2B5EF4-FFF2-40B4-BE49-F238E27FC236}">
+                <a16:creationId xmlns:a16="http://schemas.microsoft.com/office/drawing/2014/main" id="{BC7E444C-0CEB-4984-B27E-11720233BDE3}"/>
+              </a:ext>
+            </a:extLst>
+          </p:cNvPr>
+          <p:cNvSpPr txBox="1"/>
+          <p:nvPr/>
+        </p:nvSpPr>
+        <p:spPr>
+          <a:xfrm>
+            <a:off x="6155100" y="1373680"/>
+            <a:ext cx="4442675" cy="684146"/>
+          </a:xfrm>
+          <a:prstGeom prst="rect">
+            <a:avLst/>
+          </a:prstGeom>
+          <a:noFill/>
+        </p:spPr>
+        <p:txBody>
+          <a:bodyPr wrap="square" rtlCol="0">
+            <a:noAutofit/>
+          </a:bodyPr>
           <a:lstStyle/>
           <a:p>
             <a:pPr algn="ctr"/>
-            <a:endParaRPr lang="ko-KR" altLang="en-US"/>
+            <a:r>
+              <a:rPr lang="ko-KR" altLang="en-US" sz="2500" dirty="0"/>
+              <a:t>카카오 메시지 확인</a:t>
+            </a:r>
+            <a:endParaRPr lang="en-US" altLang="ko-KR" sz="2500" dirty="0"/>
+          </a:p>
+        </p:txBody>
+      </p:sp>
+      <p:sp>
+        <p:nvSpPr>
+          <p:cNvPr id="14" name="TextBox 13">
+            <a:extLst>
+              <a:ext uri="{FF2B5EF4-FFF2-40B4-BE49-F238E27FC236}">
+                <a16:creationId xmlns:a16="http://schemas.microsoft.com/office/drawing/2014/main" id="{A2A65593-E1A2-4137-B936-3D19AE71A28E}"/>
+              </a:ext>
+            </a:extLst>
+          </p:cNvPr>
+          <p:cNvSpPr txBox="1"/>
+          <p:nvPr/>
+        </p:nvSpPr>
+        <p:spPr>
+          <a:xfrm>
+            <a:off x="8376437" y="2235374"/>
+            <a:ext cx="7265267" cy="646331"/>
+          </a:xfrm>
+          <a:prstGeom prst="rect">
+            <a:avLst/>
+          </a:prstGeom>
+          <a:noFill/>
+        </p:spPr>
+        <p:txBody>
+          <a:bodyPr wrap="square" rtlCol="0">
+            <a:noAutofit/>
+          </a:bodyPr>
+          <a:lstStyle/>
+          <a:p>
+            <a:r>
+              <a:rPr lang="en-US" altLang="ko-KR"/>
+              <a:t>&lt;</a:t>
+            </a:r>
+            <a:r>
+              <a:rPr lang="ko-KR" altLang="en-US" dirty="0"/>
+              <a:t>카카오톡</a:t>
+            </a:r>
+            <a:r>
+              <a:rPr lang="en-US" altLang="ko-KR" dirty="0"/>
+              <a:t>&gt;</a:t>
+            </a:r>
           </a:p>
         </p:txBody>
       </p:sp>
     </p:spTree>
     <p:extLst>
       <p:ext uri="{BB962C8B-B14F-4D97-AF65-F5344CB8AC3E}">
-        <p14:creationId xmlns:p14="http://schemas.microsoft.com/office/powerpoint/2010/main" val="1059223428"/>
+        <p14:creationId xmlns:p14="http://schemas.microsoft.com/office/powerpoint/2010/main" val="1929874545"/>
       </p:ext>
     </p:extLst>
   </p:cSld>
@@ -7001,10 +8016,262 @@
       </p:grpSpPr>
       <p:sp>
         <p:nvSpPr>
-          <p:cNvPr id="6" name="이등변 삼각형 5">
-            <a:extLst>
-              <a:ext uri="{FF2B5EF4-FFF2-40B4-BE49-F238E27FC236}">
-                <a16:creationId xmlns:a16="http://schemas.microsoft.com/office/drawing/2014/main" id="{FB3348E3-86F8-46C8-805F-3A781BF42C6B}"/>
+          <p:cNvPr id="2" name="제목 1">
+            <a:extLst>
+              <a:ext uri="{FF2B5EF4-FFF2-40B4-BE49-F238E27FC236}">
+                <a16:creationId xmlns:a16="http://schemas.microsoft.com/office/drawing/2014/main" id="{6AAD3DF2-F891-44C2-AEB7-B70072D1C690}"/>
+              </a:ext>
+            </a:extLst>
+          </p:cNvPr>
+          <p:cNvSpPr>
+            <a:spLocks noGrp="1"/>
+          </p:cNvSpPr>
+          <p:nvPr>
+            <p:ph type="title"/>
+          </p:nvPr>
+        </p:nvSpPr>
+        <p:spPr>
+          <a:xfrm>
+            <a:off x="720000" y="-36000"/>
+            <a:ext cx="10515600" cy="1325563"/>
+          </a:xfrm>
+        </p:spPr>
+        <p:txBody>
+          <a:bodyPr/>
+          <a:lstStyle/>
+          <a:p>
+            <a:r>
+              <a:rPr lang="ko-KR" altLang="en-US"/>
+              <a:t>결론</a:t>
+            </a:r>
+            <a:endParaRPr lang="ko-KR" altLang="en-US" dirty="0"/>
+          </a:p>
+        </p:txBody>
+      </p:sp>
+      <p:sp>
+        <p:nvSpPr>
+          <p:cNvPr id="3" name="내용 개체 틀 2">
+            <a:extLst>
+              <a:ext uri="{FF2B5EF4-FFF2-40B4-BE49-F238E27FC236}">
+                <a16:creationId xmlns:a16="http://schemas.microsoft.com/office/drawing/2014/main" id="{A8E59BDD-9741-4C18-9B02-81AC513822A9}"/>
+              </a:ext>
+            </a:extLst>
+          </p:cNvPr>
+          <p:cNvSpPr>
+            <a:spLocks noGrp="1"/>
+          </p:cNvSpPr>
+          <p:nvPr>
+            <p:ph idx="1"/>
+          </p:nvPr>
+        </p:nvSpPr>
+        <p:spPr>
+          <a:xfrm>
+            <a:off x="838200" y="1532980"/>
+            <a:ext cx="10515600" cy="4658879"/>
+          </a:xfrm>
+        </p:spPr>
+        <p:txBody>
+          <a:bodyPr>
+            <a:normAutofit fontScale="92500"/>
+          </a:bodyPr>
+          <a:lstStyle/>
+          <a:p>
+            <a:pPr marL="0" indent="0">
+              <a:buNone/>
+            </a:pPr>
+            <a:endParaRPr lang="ko-KR" altLang="en-US" dirty="0"/>
+          </a:p>
+          <a:p>
+            <a:pPr marL="514350" indent="-514350">
+              <a:buAutoNum type="arabicParenR"/>
+            </a:pPr>
+            <a:r>
+              <a:rPr lang="ko-KR" altLang="en-US" sz="2500" dirty="0"/>
+              <a:t>카카오톡으로 옷 사이즈 현황을 원하는 시간대에 받아볼 수 있어 편리함</a:t>
+            </a:r>
+            <a:r>
+              <a:rPr lang="en-US" altLang="ko-KR" sz="2500" dirty="0"/>
+              <a:t>.</a:t>
+            </a:r>
+          </a:p>
+          <a:p>
+            <a:pPr marL="514350" indent="-514350">
+              <a:buAutoNum type="arabicParenR"/>
+            </a:pPr>
+            <a:endParaRPr lang="en-US" altLang="ko-KR" sz="2500" dirty="0"/>
+          </a:p>
+          <a:p>
+            <a:pPr marL="514350" indent="-514350">
+              <a:buAutoNum type="arabicParenR"/>
+            </a:pPr>
+            <a:r>
+              <a:rPr lang="ko-KR" altLang="en-US" sz="2500" dirty="0"/>
+              <a:t>타 쇼핑몰 사이트에 적용 가능하도록 함수로 작성 되어</a:t>
+            </a:r>
+            <a:r>
+              <a:rPr lang="en-US" altLang="ko-KR" sz="2500" dirty="0"/>
+              <a:t>, </a:t>
+            </a:r>
+            <a:r>
+              <a:rPr lang="ko-KR" altLang="en-US" sz="2500" dirty="0"/>
+              <a:t>코드만 간단히 변경하여 재사용 가능</a:t>
+            </a:r>
+            <a:endParaRPr lang="en-US" altLang="ko-KR" sz="2500" dirty="0"/>
+          </a:p>
+          <a:p>
+            <a:pPr marL="514350" indent="-514350">
+              <a:buAutoNum type="arabicParenR"/>
+            </a:pPr>
+            <a:endParaRPr lang="en-US" altLang="ko-KR" sz="2500" dirty="0"/>
+          </a:p>
+          <a:p>
+            <a:pPr marL="514350" indent="-514350">
+              <a:buAutoNum type="arabicParenR"/>
+            </a:pPr>
+            <a:r>
+              <a:rPr lang="ko-KR" altLang="en-US" sz="2500" dirty="0"/>
+              <a:t>카카오톡 </a:t>
+            </a:r>
+            <a:r>
+              <a:rPr lang="en-US" altLang="ko-KR" sz="2500" dirty="0"/>
+              <a:t>access token</a:t>
+            </a:r>
+            <a:r>
+              <a:rPr lang="ko-KR" altLang="en-US" sz="2500" dirty="0"/>
+              <a:t>이 </a:t>
+            </a:r>
+            <a:r>
+              <a:rPr lang="en-US" altLang="ko-KR" sz="2500" dirty="0"/>
+              <a:t>6</a:t>
+            </a:r>
+            <a:r>
+              <a:rPr lang="ko-KR" altLang="en-US" sz="2500" dirty="0"/>
+              <a:t>시간마다 </a:t>
+            </a:r>
+            <a:r>
+              <a:rPr lang="en-US" altLang="ko-KR" sz="2500" dirty="0"/>
+              <a:t>refresh </a:t>
+            </a:r>
+            <a:r>
+              <a:rPr lang="ko-KR" altLang="en-US" sz="2500" dirty="0"/>
+              <a:t>되어야 하므로</a:t>
+            </a:r>
+            <a:r>
+              <a:rPr lang="en-US" altLang="ko-KR" sz="2500" dirty="0"/>
+              <a:t>, </a:t>
+            </a:r>
+            <a:r>
+              <a:rPr lang="ko-KR" altLang="en-US" sz="2500" dirty="0"/>
+              <a:t>후에 </a:t>
+            </a:r>
+            <a:r>
+              <a:rPr lang="en-US" altLang="ko-KR" sz="2500" dirty="0"/>
+              <a:t>refresh </a:t>
+            </a:r>
+            <a:r>
+              <a:rPr lang="ko-KR" altLang="en-US" sz="2500" dirty="0"/>
+              <a:t>또한 자동화할 수 있도록 개선해야 함</a:t>
+            </a:r>
+            <a:endParaRPr lang="en-US" altLang="ko-KR" sz="2500" dirty="0"/>
+          </a:p>
+          <a:p>
+            <a:pPr marL="514350" indent="-514350">
+              <a:buAutoNum type="arabicParenR"/>
+            </a:pPr>
+            <a:endParaRPr lang="en-US" altLang="ko-KR" sz="2500" dirty="0"/>
+          </a:p>
+          <a:p>
+            <a:pPr marL="514350" indent="-514350">
+              <a:buFont typeface="Arial" panose="020B0604020202020204" pitchFamily="34" charset="0"/>
+              <a:buAutoNum type="arabicParenR"/>
+            </a:pPr>
+            <a:r>
+              <a:rPr lang="ko-KR" altLang="en-US" sz="2500" dirty="0"/>
+              <a:t>윈도우 스케줄러의 동작 오류로 인해 수동 작업을 해야 함</a:t>
+            </a:r>
+            <a:r>
+              <a:rPr lang="en-US" altLang="ko-KR" sz="2500" dirty="0"/>
+              <a:t>. </a:t>
+            </a:r>
+            <a:r>
+              <a:rPr lang="ko-KR" altLang="en-US" sz="2500" dirty="0"/>
+              <a:t>리눅스에서 </a:t>
+            </a:r>
+            <a:r>
+              <a:rPr lang="en-US" altLang="ko-KR" sz="2500" dirty="0"/>
+              <a:t>crontab</a:t>
+            </a:r>
+            <a:r>
+              <a:rPr lang="ko-KR" altLang="en-US" sz="2500" dirty="0"/>
+              <a:t>을 사용한다면 오류 없이 정상 작동될 것으로 기대</a:t>
+            </a:r>
+            <a:endParaRPr lang="en-US" altLang="ko-KR" sz="2500" dirty="0"/>
+          </a:p>
+          <a:p>
+            <a:pPr marL="514350" indent="-514350">
+              <a:buAutoNum type="arabicParenR"/>
+            </a:pPr>
+            <a:endParaRPr lang="en-US" altLang="ko-KR" sz="2500" dirty="0"/>
+          </a:p>
+          <a:p>
+            <a:pPr marL="514350" indent="-514350">
+              <a:buAutoNum type="arabicParenR"/>
+            </a:pPr>
+            <a:endParaRPr lang="en-US" altLang="ko-KR" sz="2500" dirty="0"/>
+          </a:p>
+        </p:txBody>
+      </p:sp>
+      <p:cxnSp>
+        <p:nvCxnSpPr>
+          <p:cNvPr id="6" name="직선 연결선 5">
+            <a:extLst>
+              <a:ext uri="{FF2B5EF4-FFF2-40B4-BE49-F238E27FC236}">
+                <a16:creationId xmlns:a16="http://schemas.microsoft.com/office/drawing/2014/main" id="{C64D8EDD-8543-456D-A32A-EAC76EDD1083}"/>
+              </a:ext>
+            </a:extLst>
+          </p:cNvPr>
+          <p:cNvCxnSpPr>
+            <a:cxnSpLocks/>
+          </p:cNvCxnSpPr>
+          <p:nvPr/>
+        </p:nvCxnSpPr>
+        <p:spPr>
+          <a:xfrm>
+            <a:off x="838200" y="1091953"/>
+            <a:ext cx="10633800" cy="0"/>
+          </a:xfrm>
+          <a:prstGeom prst="line">
+            <a:avLst/>
+          </a:prstGeom>
+          <a:ln w="25400">
+            <a:solidFill>
+              <a:schemeClr val="bg1">
+                <a:lumMod val="85000"/>
+              </a:schemeClr>
+            </a:solidFill>
+          </a:ln>
+        </p:spPr>
+        <p:style>
+          <a:lnRef idx="1">
+            <a:schemeClr val="accent1"/>
+          </a:lnRef>
+          <a:fillRef idx="0">
+            <a:schemeClr val="accent1"/>
+          </a:fillRef>
+          <a:effectRef idx="0">
+            <a:schemeClr val="accent1"/>
+          </a:effectRef>
+          <a:fontRef idx="minor">
+            <a:schemeClr val="tx1"/>
+          </a:fontRef>
+        </p:style>
+      </p:cxnSp>
+      <p:sp>
+        <p:nvSpPr>
+          <p:cNvPr id="8" name="이등변 삼각형 7">
+            <a:extLst>
+              <a:ext uri="{FF2B5EF4-FFF2-40B4-BE49-F238E27FC236}">
+                <a16:creationId xmlns:a16="http://schemas.microsoft.com/office/drawing/2014/main" id="{3DA4B491-4686-4306-9580-F61E6E2C8485}"/>
               </a:ext>
             </a:extLst>
           </p:cNvPr>
@@ -7055,10 +8322,10 @@
       </p:sp>
       <p:sp>
         <p:nvSpPr>
-          <p:cNvPr id="7" name="이등변 삼각형 6">
-            <a:extLst>
-              <a:ext uri="{FF2B5EF4-FFF2-40B4-BE49-F238E27FC236}">
-                <a16:creationId xmlns:a16="http://schemas.microsoft.com/office/drawing/2014/main" id="{6FE485EF-2DBD-4265-A4BD-3D5D2D2AD541}"/>
+          <p:cNvPr id="9" name="이등변 삼각형 8">
+            <a:extLst>
+              <a:ext uri="{FF2B5EF4-FFF2-40B4-BE49-F238E27FC236}">
+                <a16:creationId xmlns:a16="http://schemas.microsoft.com/office/drawing/2014/main" id="{5257D612-744C-4CAA-ACA7-25BEC7CD7A9F}"/>
               </a:ext>
             </a:extLst>
           </p:cNvPr>
@@ -7107,51 +8374,10 @@
           </a:p>
         </p:txBody>
       </p:sp>
-      <p:sp>
-        <p:nvSpPr>
-          <p:cNvPr id="25" name="TextBox 24">
-            <a:extLst>
-              <a:ext uri="{FF2B5EF4-FFF2-40B4-BE49-F238E27FC236}">
-                <a16:creationId xmlns:a16="http://schemas.microsoft.com/office/drawing/2014/main" id="{ADEA0D14-7A75-4951-9CD9-E83759E8936C}"/>
-              </a:ext>
-            </a:extLst>
-          </p:cNvPr>
-          <p:cNvSpPr txBox="1"/>
-          <p:nvPr/>
-        </p:nvSpPr>
-        <p:spPr>
-          <a:xfrm>
-            <a:off x="3636005" y="144980"/>
-            <a:ext cx="4442675" cy="684146"/>
-          </a:xfrm>
-          <a:prstGeom prst="rect">
-            <a:avLst/>
-          </a:prstGeom>
-          <a:noFill/>
-        </p:spPr>
-        <p:txBody>
-          <a:bodyPr wrap="square" rtlCol="0">
-            <a:noAutofit/>
-          </a:bodyPr>
-          <a:lstStyle/>
-          <a:p>
-            <a:pPr algn="r"/>
-            <a:r>
-              <a:rPr lang="en-US" altLang="ko-KR" sz="2500" dirty="0"/>
-              <a:t>Redirect URI </a:t>
-            </a:r>
-            <a:r>
-              <a:rPr lang="ko-KR" altLang="en-US" sz="2500" dirty="0"/>
-              <a:t>설정</a:t>
-            </a:r>
-            <a:endParaRPr lang="en-US" altLang="ko-KR" sz="2500" dirty="0"/>
-          </a:p>
-        </p:txBody>
-      </p:sp>
     </p:spTree>
     <p:extLst>
       <p:ext uri="{BB962C8B-B14F-4D97-AF65-F5344CB8AC3E}">
-        <p14:creationId xmlns:p14="http://schemas.microsoft.com/office/powerpoint/2010/main" val="2367486372"/>
+        <p14:creationId xmlns:p14="http://schemas.microsoft.com/office/powerpoint/2010/main" val="873903471"/>
       </p:ext>
     </p:extLst>
   </p:cSld>
@@ -7162,185 +8388,6 @@
 </file>
 
 <file path=ppt/slides/slide22.xml><?xml version="1.0" encoding="utf-8"?>
-<p:sld xmlns:a="http://schemas.openxmlformats.org/drawingml/2006/main" xmlns:r="http://schemas.openxmlformats.org/officeDocument/2006/relationships" xmlns:p="http://schemas.openxmlformats.org/presentationml/2006/main">
-  <p:cSld>
-    <p:spTree>
-      <p:nvGrpSpPr>
-        <p:cNvPr id="1" name=""/>
-        <p:cNvGrpSpPr/>
-        <p:nvPr/>
-      </p:nvGrpSpPr>
-      <p:grpSpPr>
-        <a:xfrm>
-          <a:off x="0" y="0"/>
-          <a:ext cx="0" cy="0"/>
-          <a:chOff x="0" y="0"/>
-          <a:chExt cx="0" cy="0"/>
-        </a:xfrm>
-      </p:grpSpPr>
-      <p:sp>
-        <p:nvSpPr>
-          <p:cNvPr id="6" name="이등변 삼각형 5">
-            <a:extLst>
-              <a:ext uri="{FF2B5EF4-FFF2-40B4-BE49-F238E27FC236}">
-                <a16:creationId xmlns:a16="http://schemas.microsoft.com/office/drawing/2014/main" id="{FB3348E3-86F8-46C8-805F-3A781BF42C6B}"/>
-              </a:ext>
-            </a:extLst>
-          </p:cNvPr>
-          <p:cNvSpPr/>
-          <p:nvPr/>
-        </p:nvSpPr>
-        <p:spPr>
-          <a:xfrm>
-            <a:off x="11651226" y="6318000"/>
-            <a:ext cx="540774" cy="540000"/>
-          </a:xfrm>
-          <a:prstGeom prst="triangle">
-            <a:avLst>
-              <a:gd name="adj" fmla="val 100000"/>
-            </a:avLst>
-          </a:prstGeom>
-          <a:solidFill>
-            <a:srgbClr val="840202"/>
-          </a:solidFill>
-          <a:ln>
-            <a:noFill/>
-          </a:ln>
-        </p:spPr>
-        <p:style>
-          <a:lnRef idx="2">
-            <a:schemeClr val="accent1">
-              <a:shade val="50000"/>
-            </a:schemeClr>
-          </a:lnRef>
-          <a:fillRef idx="1">
-            <a:schemeClr val="accent1"/>
-          </a:fillRef>
-          <a:effectRef idx="0">
-            <a:schemeClr val="accent1"/>
-          </a:effectRef>
-          <a:fontRef idx="minor">
-            <a:schemeClr val="lt1"/>
-          </a:fontRef>
-        </p:style>
-        <p:txBody>
-          <a:bodyPr rtlCol="0" anchor="ctr"/>
-          <a:lstStyle/>
-          <a:p>
-            <a:pPr algn="ctr"/>
-            <a:endParaRPr lang="ko-KR" altLang="en-US" dirty="0"/>
-          </a:p>
-        </p:txBody>
-      </p:sp>
-      <p:sp>
-        <p:nvSpPr>
-          <p:cNvPr id="7" name="이등변 삼각형 6">
-            <a:extLst>
-              <a:ext uri="{FF2B5EF4-FFF2-40B4-BE49-F238E27FC236}">
-                <a16:creationId xmlns:a16="http://schemas.microsoft.com/office/drawing/2014/main" id="{6FE485EF-2DBD-4265-A4BD-3D5D2D2AD541}"/>
-              </a:ext>
-            </a:extLst>
-          </p:cNvPr>
-          <p:cNvSpPr/>
-          <p:nvPr/>
-        </p:nvSpPr>
-        <p:spPr>
-          <a:xfrm rot="10800000">
-            <a:off x="0" y="0"/>
-            <a:ext cx="540774" cy="540000"/>
-          </a:xfrm>
-          <a:prstGeom prst="triangle">
-            <a:avLst>
-              <a:gd name="adj" fmla="val 100000"/>
-            </a:avLst>
-          </a:prstGeom>
-          <a:solidFill>
-            <a:srgbClr val="840202"/>
-          </a:solidFill>
-          <a:ln>
-            <a:noFill/>
-          </a:ln>
-        </p:spPr>
-        <p:style>
-          <a:lnRef idx="2">
-            <a:schemeClr val="accent1">
-              <a:shade val="50000"/>
-            </a:schemeClr>
-          </a:lnRef>
-          <a:fillRef idx="1">
-            <a:schemeClr val="accent1"/>
-          </a:fillRef>
-          <a:effectRef idx="0">
-            <a:schemeClr val="accent1"/>
-          </a:effectRef>
-          <a:fontRef idx="minor">
-            <a:schemeClr val="lt1"/>
-          </a:fontRef>
-        </p:style>
-        <p:txBody>
-          <a:bodyPr rtlCol="0" anchor="ctr"/>
-          <a:lstStyle/>
-          <a:p>
-            <a:pPr algn="ctr"/>
-            <a:endParaRPr lang="ko-KR" altLang="en-US" dirty="0"/>
-          </a:p>
-        </p:txBody>
-      </p:sp>
-      <p:sp>
-        <p:nvSpPr>
-          <p:cNvPr id="25" name="TextBox 24">
-            <a:extLst>
-              <a:ext uri="{FF2B5EF4-FFF2-40B4-BE49-F238E27FC236}">
-                <a16:creationId xmlns:a16="http://schemas.microsoft.com/office/drawing/2014/main" id="{ADEA0D14-7A75-4951-9CD9-E83759E8936C}"/>
-              </a:ext>
-            </a:extLst>
-          </p:cNvPr>
-          <p:cNvSpPr txBox="1"/>
-          <p:nvPr/>
-        </p:nvSpPr>
-        <p:spPr>
-          <a:xfrm>
-            <a:off x="3636005" y="144980"/>
-            <a:ext cx="4442675" cy="684146"/>
-          </a:xfrm>
-          <a:prstGeom prst="rect">
-            <a:avLst/>
-          </a:prstGeom>
-          <a:noFill/>
-        </p:spPr>
-        <p:txBody>
-          <a:bodyPr wrap="square" rtlCol="0">
-            <a:noAutofit/>
-          </a:bodyPr>
-          <a:lstStyle/>
-          <a:p>
-            <a:pPr algn="r"/>
-            <a:r>
-              <a:rPr lang="en-US" altLang="ko-KR" sz="2500" dirty="0"/>
-              <a:t>Redirect URI </a:t>
-            </a:r>
-            <a:r>
-              <a:rPr lang="ko-KR" altLang="en-US" sz="2500" dirty="0"/>
-              <a:t>설정</a:t>
-            </a:r>
-            <a:endParaRPr lang="en-US" altLang="ko-KR" sz="2500" dirty="0"/>
-          </a:p>
-        </p:txBody>
-      </p:sp>
-    </p:spTree>
-    <p:extLst>
-      <p:ext uri="{BB962C8B-B14F-4D97-AF65-F5344CB8AC3E}">
-        <p14:creationId xmlns:p14="http://schemas.microsoft.com/office/powerpoint/2010/main" val="458794950"/>
-      </p:ext>
-    </p:extLst>
-  </p:cSld>
-  <p:clrMapOvr>
-    <a:masterClrMapping/>
-  </p:clrMapOvr>
-</p:sld>
-</file>
-
-<file path=ppt/slides/slide23.xml><?xml version="1.0" encoding="utf-8"?>
 <p:sld xmlns:a="http://schemas.openxmlformats.org/drawingml/2006/main" xmlns:r="http://schemas.openxmlformats.org/officeDocument/2006/relationships" xmlns:p="http://schemas.openxmlformats.org/presentationml/2006/main">
   <p:cSld>
     <p:spTree>
@@ -7647,17 +8694,12 @@
             </a:pPr>
             <a:r>
               <a:rPr lang="ko-KR" altLang="en-US" sz="2500" dirty="0"/>
-              <a:t>원하는 목적의 정보를 습득하여 활용할 수 있도록 한다</a:t>
+              <a:t>쇼핑몰 사이트에서 필요한 정보를 추출하여 카카오톡을 통해 정보를 받아볼 수 있도록 한다</a:t>
             </a:r>
             <a:r>
               <a:rPr lang="en-US" altLang="ko-KR" sz="2500" dirty="0"/>
               <a:t>.</a:t>
             </a:r>
-          </a:p>
-          <a:p>
-            <a:pPr marL="0" indent="0">
-              <a:buNone/>
-            </a:pPr>
             <a:endParaRPr lang="en-US" altLang="ko-KR" dirty="0"/>
           </a:p>
         </p:txBody>
@@ -7920,7 +8962,7 @@
             </a:r>
             <a:r>
               <a:rPr lang="en-US" altLang="ko-KR" dirty="0"/>
-              <a:t>3</a:t>
+              <a:t>4</a:t>
             </a:r>
             <a:r>
               <a:rPr lang="ko-KR" altLang="en-US" dirty="0"/>
@@ -8219,7 +9261,7 @@
           <a:p>
             <a:r>
               <a:rPr lang="en-US" altLang="ko-KR" sz="2500" dirty="0"/>
-              <a:t>: 8/27</a:t>
+              <a:t>: 8/27 – 8/28</a:t>
             </a:r>
           </a:p>
           <a:p>
@@ -9628,14 +10670,137 @@
         </p:blipFill>
         <p:spPr>
           <a:xfrm>
-            <a:off x="540774" y="718430"/>
-            <a:ext cx="6915150" cy="6000750"/>
+            <a:off x="838200" y="1391170"/>
+            <a:ext cx="5988728" cy="5196830"/>
           </a:xfrm>
           <a:prstGeom prst="rect">
             <a:avLst/>
           </a:prstGeom>
+          <a:ln>
+            <a:solidFill>
+              <a:schemeClr val="tx1"/>
+            </a:solidFill>
+          </a:ln>
         </p:spPr>
       </p:pic>
+      <p:sp>
+        <p:nvSpPr>
+          <p:cNvPr id="8" name="제목 1">
+            <a:extLst>
+              <a:ext uri="{FF2B5EF4-FFF2-40B4-BE49-F238E27FC236}">
+                <a16:creationId xmlns:a16="http://schemas.microsoft.com/office/drawing/2014/main" id="{02A77588-9F9E-4F74-9141-998D09D6FF35}"/>
+              </a:ext>
+            </a:extLst>
+          </p:cNvPr>
+          <p:cNvSpPr>
+            <a:spLocks noGrp="1"/>
+          </p:cNvSpPr>
+          <p:nvPr>
+            <p:ph type="title"/>
+          </p:nvPr>
+        </p:nvSpPr>
+        <p:spPr>
+          <a:xfrm>
+            <a:off x="720000" y="-36000"/>
+            <a:ext cx="10515600" cy="1325563"/>
+          </a:xfrm>
+        </p:spPr>
+        <p:txBody>
+          <a:bodyPr/>
+          <a:lstStyle/>
+          <a:p>
+            <a:r>
+              <a:rPr lang="ko-KR" altLang="en-US" dirty="0"/>
+              <a:t>구현</a:t>
+            </a:r>
+          </a:p>
+        </p:txBody>
+      </p:sp>
+      <p:cxnSp>
+        <p:nvCxnSpPr>
+          <p:cNvPr id="9" name="직선 연결선 8">
+            <a:extLst>
+              <a:ext uri="{FF2B5EF4-FFF2-40B4-BE49-F238E27FC236}">
+                <a16:creationId xmlns:a16="http://schemas.microsoft.com/office/drawing/2014/main" id="{8B6DDB79-A0E3-4300-8A87-FF8321FC5DBB}"/>
+              </a:ext>
+            </a:extLst>
+          </p:cNvPr>
+          <p:cNvCxnSpPr>
+            <a:cxnSpLocks/>
+          </p:cNvCxnSpPr>
+          <p:nvPr/>
+        </p:nvCxnSpPr>
+        <p:spPr>
+          <a:xfrm>
+            <a:off x="838200" y="1091953"/>
+            <a:ext cx="10633800" cy="0"/>
+          </a:xfrm>
+          <a:prstGeom prst="line">
+            <a:avLst/>
+          </a:prstGeom>
+          <a:ln w="25400">
+            <a:solidFill>
+              <a:schemeClr val="bg1">
+                <a:lumMod val="85000"/>
+              </a:schemeClr>
+            </a:solidFill>
+          </a:ln>
+        </p:spPr>
+        <p:style>
+          <a:lnRef idx="1">
+            <a:schemeClr val="accent1"/>
+          </a:lnRef>
+          <a:fillRef idx="0">
+            <a:schemeClr val="accent1"/>
+          </a:fillRef>
+          <a:effectRef idx="0">
+            <a:schemeClr val="accent1"/>
+          </a:effectRef>
+          <a:fontRef idx="minor">
+            <a:schemeClr val="tx1"/>
+          </a:fontRef>
+        </p:style>
+      </p:cxnSp>
+      <p:sp>
+        <p:nvSpPr>
+          <p:cNvPr id="10" name="TextBox 9">
+            <a:extLst>
+              <a:ext uri="{FF2B5EF4-FFF2-40B4-BE49-F238E27FC236}">
+                <a16:creationId xmlns:a16="http://schemas.microsoft.com/office/drawing/2014/main" id="{A439F164-521E-4E2B-9DAD-263AEDF09C3A}"/>
+              </a:ext>
+            </a:extLst>
+          </p:cNvPr>
+          <p:cNvSpPr txBox="1"/>
+          <p:nvPr/>
+        </p:nvSpPr>
+        <p:spPr>
+          <a:xfrm>
+            <a:off x="7261272" y="2012151"/>
+            <a:ext cx="3889081" cy="646331"/>
+          </a:xfrm>
+          <a:prstGeom prst="rect">
+            <a:avLst/>
+          </a:prstGeom>
+          <a:noFill/>
+        </p:spPr>
+        <p:txBody>
+          <a:bodyPr wrap="square" rtlCol="0">
+            <a:noAutofit/>
+          </a:bodyPr>
+          <a:lstStyle/>
+          <a:p>
+            <a:r>
+              <a:rPr lang="ko-KR" altLang="en-US" sz="2500" dirty="0" err="1"/>
+              <a:t>트루바두르라는</a:t>
+            </a:r>
+            <a:r>
+              <a:rPr lang="ko-KR" altLang="en-US" sz="2500" dirty="0"/>
+              <a:t> 쇼핑몰의 인기 있는 바지를 대상으로 함</a:t>
+            </a:r>
+            <a:endParaRPr lang="en-US" altLang="ko-KR" sz="2500" dirty="0"/>
+          </a:p>
+        </p:txBody>
+      </p:sp>
     </p:spTree>
     <p:extLst>
       <p:ext uri="{BB962C8B-B14F-4D97-AF65-F5344CB8AC3E}">
@@ -9788,22 +10953,30 @@
         </p:nvSpPr>
         <p:spPr>
           <a:xfrm>
-            <a:off x="1876927" y="1357245"/>
-            <a:ext cx="6096000" cy="646331"/>
+            <a:off x="6462994" y="2173474"/>
+            <a:ext cx="5411639" cy="646331"/>
           </a:xfrm>
           <a:prstGeom prst="rect">
             <a:avLst/>
           </a:prstGeom>
         </p:spPr>
         <p:txBody>
-          <a:bodyPr>
+          <a:bodyPr wrap="square">
             <a:spAutoFit/>
           </a:bodyPr>
           <a:lstStyle/>
           <a:p>
             <a:r>
               <a:rPr lang="ko-KR" altLang="en-US" dirty="0"/>
-              <a:t>https://troubadour.kr/product/detail.html?product_no=1105&amp;cate_no=45&amp;display_group=1#none</a:t>
+              <a:t>https://troubadour.kr/product/detail.html?product_no=1105</a:t>
+            </a:r>
+            <a:r>
+              <a:rPr lang="ko-KR" altLang="en-US" b="1" dirty="0">
+                <a:solidFill>
+                  <a:srgbClr val="FF0000"/>
+                </a:solidFill>
+              </a:rPr>
+              <a:t>&amp;cate_no=45&amp;display_group=1#none</a:t>
             </a:r>
           </a:p>
         </p:txBody>
@@ -9822,15 +10995,15 @@
         </p:nvSpPr>
         <p:spPr>
           <a:xfrm>
-            <a:off x="1876927" y="2424045"/>
-            <a:ext cx="6096000" cy="646331"/>
+            <a:off x="6462993" y="4177331"/>
+            <a:ext cx="5411639" cy="646331"/>
           </a:xfrm>
           <a:prstGeom prst="rect">
             <a:avLst/>
           </a:prstGeom>
         </p:spPr>
         <p:txBody>
-          <a:bodyPr>
+          <a:bodyPr wrap="square">
             <a:spAutoFit/>
           </a:bodyPr>
           <a:lstStyle/>
@@ -9856,8 +11029,8 @@
         </p:nvSpPr>
         <p:spPr>
           <a:xfrm>
-            <a:off x="3529263" y="138820"/>
-            <a:ext cx="4506025" cy="646331"/>
+            <a:off x="838200" y="1441267"/>
+            <a:ext cx="6033117" cy="646331"/>
           </a:xfrm>
           <a:prstGeom prst="rect">
             <a:avLst/>
@@ -9875,6 +11048,171 @@
               <a:t>주소에서 필요 없는 파라미터 삭제</a:t>
             </a:r>
             <a:endParaRPr lang="en-US" altLang="ko-KR" sz="2500" dirty="0"/>
+          </a:p>
+        </p:txBody>
+      </p:sp>
+      <p:pic>
+        <p:nvPicPr>
+          <p:cNvPr id="3" name="그림 2">
+            <a:extLst>
+              <a:ext uri="{FF2B5EF4-FFF2-40B4-BE49-F238E27FC236}">
+                <a16:creationId xmlns:a16="http://schemas.microsoft.com/office/drawing/2014/main" id="{2BDDCB6A-7DCB-41C8-A211-C5CA5E2CF185}"/>
+              </a:ext>
+            </a:extLst>
+          </p:cNvPr>
+          <p:cNvPicPr>
+            <a:picLocks noChangeAspect="1"/>
+          </p:cNvPicPr>
+          <p:nvPr/>
+        </p:nvPicPr>
+        <p:blipFill>
+          <a:blip r:embed="rId2"/>
+          <a:stretch>
+            <a:fillRect/>
+          </a:stretch>
+        </p:blipFill>
+        <p:spPr>
+          <a:xfrm>
+            <a:off x="556933" y="2239302"/>
+            <a:ext cx="5172075" cy="3200400"/>
+          </a:xfrm>
+          <a:prstGeom prst="rect">
+            <a:avLst/>
+          </a:prstGeom>
+          <a:ln>
+            <a:solidFill>
+              <a:schemeClr val="tx1"/>
+            </a:solidFill>
+          </a:ln>
+        </p:spPr>
+      </p:pic>
+      <p:sp>
+        <p:nvSpPr>
+          <p:cNvPr id="11" name="제목 1">
+            <a:extLst>
+              <a:ext uri="{FF2B5EF4-FFF2-40B4-BE49-F238E27FC236}">
+                <a16:creationId xmlns:a16="http://schemas.microsoft.com/office/drawing/2014/main" id="{3C68C3EB-3AF3-49E6-8081-015BA1DBE37F}"/>
+              </a:ext>
+            </a:extLst>
+          </p:cNvPr>
+          <p:cNvSpPr>
+            <a:spLocks noGrp="1"/>
+          </p:cNvSpPr>
+          <p:nvPr>
+            <p:ph type="title"/>
+          </p:nvPr>
+        </p:nvSpPr>
+        <p:spPr>
+          <a:xfrm>
+            <a:off x="720000" y="-36000"/>
+            <a:ext cx="10515600" cy="1325563"/>
+          </a:xfrm>
+        </p:spPr>
+        <p:txBody>
+          <a:bodyPr/>
+          <a:lstStyle/>
+          <a:p>
+            <a:r>
+              <a:rPr lang="ko-KR" altLang="en-US" dirty="0"/>
+              <a:t>구현</a:t>
+            </a:r>
+          </a:p>
+        </p:txBody>
+      </p:sp>
+      <p:cxnSp>
+        <p:nvCxnSpPr>
+          <p:cNvPr id="12" name="직선 연결선 11">
+            <a:extLst>
+              <a:ext uri="{FF2B5EF4-FFF2-40B4-BE49-F238E27FC236}">
+                <a16:creationId xmlns:a16="http://schemas.microsoft.com/office/drawing/2014/main" id="{81D9B283-D918-4481-A5D4-9DDFDCC1623F}"/>
+              </a:ext>
+            </a:extLst>
+          </p:cNvPr>
+          <p:cNvCxnSpPr>
+            <a:cxnSpLocks/>
+          </p:cNvCxnSpPr>
+          <p:nvPr/>
+        </p:nvCxnSpPr>
+        <p:spPr>
+          <a:xfrm>
+            <a:off x="838200" y="1091953"/>
+            <a:ext cx="10633800" cy="0"/>
+          </a:xfrm>
+          <a:prstGeom prst="line">
+            <a:avLst/>
+          </a:prstGeom>
+          <a:ln w="25400">
+            <a:solidFill>
+              <a:schemeClr val="bg1">
+                <a:lumMod val="85000"/>
+              </a:schemeClr>
+            </a:solidFill>
+          </a:ln>
+        </p:spPr>
+        <p:style>
+          <a:lnRef idx="1">
+            <a:schemeClr val="accent1"/>
+          </a:lnRef>
+          <a:fillRef idx="0">
+            <a:schemeClr val="accent1"/>
+          </a:fillRef>
+          <a:effectRef idx="0">
+            <a:schemeClr val="accent1"/>
+          </a:effectRef>
+          <a:fontRef idx="minor">
+            <a:schemeClr val="tx1"/>
+          </a:fontRef>
+        </p:style>
+      </p:cxnSp>
+      <p:sp>
+        <p:nvSpPr>
+          <p:cNvPr id="9" name="화살표: 아래쪽 8">
+            <a:extLst>
+              <a:ext uri="{FF2B5EF4-FFF2-40B4-BE49-F238E27FC236}">
+                <a16:creationId xmlns:a16="http://schemas.microsoft.com/office/drawing/2014/main" id="{96DF2BB6-5DA3-402B-9FF2-17563C2A78A7}"/>
+              </a:ext>
+            </a:extLst>
+          </p:cNvPr>
+          <p:cNvSpPr/>
+          <p:nvPr/>
+        </p:nvSpPr>
+        <p:spPr>
+          <a:xfrm>
+            <a:off x="9037468" y="3142695"/>
+            <a:ext cx="292963" cy="772358"/>
+          </a:xfrm>
+          <a:prstGeom prst="downArrow">
+            <a:avLst/>
+          </a:prstGeom>
+          <a:solidFill>
+            <a:srgbClr val="840202"/>
+          </a:solidFill>
+          <a:ln>
+            <a:noFill/>
+          </a:ln>
+        </p:spPr>
+        <p:style>
+          <a:lnRef idx="2">
+            <a:schemeClr val="accent1">
+              <a:shade val="50000"/>
+            </a:schemeClr>
+          </a:lnRef>
+          <a:fillRef idx="1">
+            <a:schemeClr val="accent1"/>
+          </a:fillRef>
+          <a:effectRef idx="0">
+            <a:schemeClr val="accent1"/>
+          </a:effectRef>
+          <a:fontRef idx="minor">
+            <a:schemeClr val="lt1"/>
+          </a:fontRef>
+        </p:style>
+        <p:txBody>
+          <a:bodyPr rtlCol="0" anchor="ctr"/>
+          <a:lstStyle/>
+          <a:p>
+            <a:pPr algn="ctr"/>
+            <a:endParaRPr lang="ko-KR" altLang="en-US"/>
           </a:p>
         </p:txBody>
       </p:sp>
@@ -10030,8 +11368,8 @@
         </p:nvSpPr>
         <p:spPr>
           <a:xfrm>
-            <a:off x="770021" y="138820"/>
-            <a:ext cx="7265267" cy="646331"/>
+            <a:off x="6155101" y="2579294"/>
+            <a:ext cx="5095876" cy="646331"/>
           </a:xfrm>
           <a:prstGeom prst="rect">
             <a:avLst/>
@@ -10046,7 +11384,20 @@
           <a:p>
             <a:r>
               <a:rPr lang="ko-KR" altLang="en-US" sz="2500" dirty="0"/>
-              <a:t>색상을 선택하고 사이즈를 선택해야하는 시스템이므로 색상 클릭</a:t>
+              <a:t>색상을 선택하고 사이즈를 선택해야하는 시스템이므로</a:t>
+            </a:r>
+            <a:r>
+              <a:rPr lang="en-US" altLang="ko-KR" sz="2500" dirty="0"/>
+              <a:t>,</a:t>
+            </a:r>
+          </a:p>
+          <a:p>
+            <a:endParaRPr lang="en-US" altLang="ko-KR" sz="2500" dirty="0"/>
+          </a:p>
+          <a:p>
+            <a:r>
+              <a:rPr lang="ko-KR" altLang="en-US" sz="2500" dirty="0"/>
+              <a:t>색상 클릭</a:t>
             </a:r>
             <a:r>
               <a:rPr lang="en-US" altLang="ko-KR" sz="2500" dirty="0"/>
@@ -10054,7 +11405,7 @@
             </a:r>
             <a:r>
               <a:rPr lang="ko-KR" altLang="en-US" sz="2500" dirty="0"/>
-              <a:t>사이즈 클릭 순으로 진행 </a:t>
+              <a:t>사이즈 클릭 순으로 진행 예정</a:t>
             </a:r>
             <a:endParaRPr lang="en-US" altLang="ko-KR" sz="2500" dirty="0"/>
           </a:p>
@@ -10074,7 +11425,7 @@
         </p:nvGrpSpPr>
         <p:grpSpPr>
           <a:xfrm>
-            <a:off x="888364" y="2628901"/>
+            <a:off x="1000125" y="2456006"/>
             <a:ext cx="5095875" cy="2667000"/>
             <a:chOff x="1000124" y="1805941"/>
             <a:chExt cx="5095875" cy="2667000"/>
@@ -10108,6 +11459,11 @@
             <a:prstGeom prst="rect">
               <a:avLst/>
             </a:prstGeom>
+            <a:ln>
+              <a:solidFill>
+                <a:schemeClr val="tx1"/>
+              </a:solidFill>
+            </a:ln>
           </p:spPr>
         </p:pic>
         <p:sp>
@@ -10215,6 +11571,84 @@
           </p:txBody>
         </p:sp>
       </p:grpSp>
+      <p:sp>
+        <p:nvSpPr>
+          <p:cNvPr id="10" name="제목 1">
+            <a:extLst>
+              <a:ext uri="{FF2B5EF4-FFF2-40B4-BE49-F238E27FC236}">
+                <a16:creationId xmlns:a16="http://schemas.microsoft.com/office/drawing/2014/main" id="{D3D81E00-7878-42FA-8C4E-D64A0EE9806A}"/>
+              </a:ext>
+            </a:extLst>
+          </p:cNvPr>
+          <p:cNvSpPr>
+            <a:spLocks noGrp="1"/>
+          </p:cNvSpPr>
+          <p:nvPr>
+            <p:ph type="title"/>
+          </p:nvPr>
+        </p:nvSpPr>
+        <p:spPr>
+          <a:xfrm>
+            <a:off x="720000" y="-36000"/>
+            <a:ext cx="10515600" cy="1325563"/>
+          </a:xfrm>
+        </p:spPr>
+        <p:txBody>
+          <a:bodyPr/>
+          <a:lstStyle/>
+          <a:p>
+            <a:r>
+              <a:rPr lang="ko-KR" altLang="en-US" dirty="0"/>
+              <a:t>구현</a:t>
+            </a:r>
+          </a:p>
+        </p:txBody>
+      </p:sp>
+      <p:cxnSp>
+        <p:nvCxnSpPr>
+          <p:cNvPr id="11" name="직선 연결선 10">
+            <a:extLst>
+              <a:ext uri="{FF2B5EF4-FFF2-40B4-BE49-F238E27FC236}">
+                <a16:creationId xmlns:a16="http://schemas.microsoft.com/office/drawing/2014/main" id="{ADC14CE8-B273-457D-8101-AD8CDE128635}"/>
+              </a:ext>
+            </a:extLst>
+          </p:cNvPr>
+          <p:cNvCxnSpPr>
+            <a:cxnSpLocks/>
+          </p:cNvCxnSpPr>
+          <p:nvPr/>
+        </p:nvCxnSpPr>
+        <p:spPr>
+          <a:xfrm>
+            <a:off x="838200" y="1091953"/>
+            <a:ext cx="10633800" cy="0"/>
+          </a:xfrm>
+          <a:prstGeom prst="line">
+            <a:avLst/>
+          </a:prstGeom>
+          <a:ln w="25400">
+            <a:solidFill>
+              <a:schemeClr val="bg1">
+                <a:lumMod val="85000"/>
+              </a:schemeClr>
+            </a:solidFill>
+          </a:ln>
+        </p:spPr>
+        <p:style>
+          <a:lnRef idx="1">
+            <a:schemeClr val="accent1"/>
+          </a:lnRef>
+          <a:fillRef idx="0">
+            <a:schemeClr val="accent1"/>
+          </a:fillRef>
+          <a:effectRef idx="0">
+            <a:schemeClr val="accent1"/>
+          </a:effectRef>
+          <a:fontRef idx="minor">
+            <a:schemeClr val="tx1"/>
+          </a:fontRef>
+        </p:style>
+      </p:cxnSp>
     </p:spTree>
     <p:extLst>
       <p:ext uri="{BB962C8B-B14F-4D97-AF65-F5344CB8AC3E}">

</xml_diff>

<commit_message>
Add first Level2 coding problem
</commit_message>
<xml_diff>
--- a/semi_projects/쇼핑몰 옷 사이즈 확인 크롤링/쇼핑몰 옷 사이즈 확인 크롤링.pptx
+++ b/semi_projects/쇼핑몰 옷 사이즈 확인 크롤링/쇼핑몰 옷 사이즈 확인 크롤링.pptx
@@ -291,7 +291,7 @@
           <a:p>
             <a:fld id="{D512FCAD-8E72-4490-9D67-FF3ADE8F49C3}" type="datetimeFigureOut">
               <a:rPr lang="ko-KR" altLang="en-US" smtClean="0"/>
-              <a:t>2021-08-29</a:t>
+              <a:t>2021-10-21</a:t>
             </a:fld>
             <a:endParaRPr lang="ko-KR" altLang="en-US"/>
           </a:p>
@@ -489,7 +489,7 @@
           <a:p>
             <a:fld id="{D512FCAD-8E72-4490-9D67-FF3ADE8F49C3}" type="datetimeFigureOut">
               <a:rPr lang="ko-KR" altLang="en-US" smtClean="0"/>
-              <a:t>2021-08-29</a:t>
+              <a:t>2021-10-21</a:t>
             </a:fld>
             <a:endParaRPr lang="ko-KR" altLang="en-US"/>
           </a:p>
@@ -697,7 +697,7 @@
           <a:p>
             <a:fld id="{D512FCAD-8E72-4490-9D67-FF3ADE8F49C3}" type="datetimeFigureOut">
               <a:rPr lang="ko-KR" altLang="en-US" smtClean="0"/>
-              <a:t>2021-08-29</a:t>
+              <a:t>2021-10-21</a:t>
             </a:fld>
             <a:endParaRPr lang="ko-KR" altLang="en-US"/>
           </a:p>
@@ -895,7 +895,7 @@
           <a:p>
             <a:fld id="{D512FCAD-8E72-4490-9D67-FF3ADE8F49C3}" type="datetimeFigureOut">
               <a:rPr lang="ko-KR" altLang="en-US" smtClean="0"/>
-              <a:t>2021-08-29</a:t>
+              <a:t>2021-10-21</a:t>
             </a:fld>
             <a:endParaRPr lang="ko-KR" altLang="en-US"/>
           </a:p>
@@ -1170,7 +1170,7 @@
           <a:p>
             <a:fld id="{D512FCAD-8E72-4490-9D67-FF3ADE8F49C3}" type="datetimeFigureOut">
               <a:rPr lang="ko-KR" altLang="en-US" smtClean="0"/>
-              <a:t>2021-08-29</a:t>
+              <a:t>2021-10-21</a:t>
             </a:fld>
             <a:endParaRPr lang="ko-KR" altLang="en-US"/>
           </a:p>
@@ -1435,7 +1435,7 @@
           <a:p>
             <a:fld id="{D512FCAD-8E72-4490-9D67-FF3ADE8F49C3}" type="datetimeFigureOut">
               <a:rPr lang="ko-KR" altLang="en-US" smtClean="0"/>
-              <a:t>2021-08-29</a:t>
+              <a:t>2021-10-21</a:t>
             </a:fld>
             <a:endParaRPr lang="ko-KR" altLang="en-US"/>
           </a:p>
@@ -1847,7 +1847,7 @@
           <a:p>
             <a:fld id="{D512FCAD-8E72-4490-9D67-FF3ADE8F49C3}" type="datetimeFigureOut">
               <a:rPr lang="ko-KR" altLang="en-US" smtClean="0"/>
-              <a:t>2021-08-29</a:t>
+              <a:t>2021-10-21</a:t>
             </a:fld>
             <a:endParaRPr lang="ko-KR" altLang="en-US"/>
           </a:p>
@@ -1988,7 +1988,7 @@
           <a:p>
             <a:fld id="{D512FCAD-8E72-4490-9D67-FF3ADE8F49C3}" type="datetimeFigureOut">
               <a:rPr lang="ko-KR" altLang="en-US" smtClean="0"/>
-              <a:t>2021-08-29</a:t>
+              <a:t>2021-10-21</a:t>
             </a:fld>
             <a:endParaRPr lang="ko-KR" altLang="en-US"/>
           </a:p>
@@ -2101,7 +2101,7 @@
           <a:p>
             <a:fld id="{D512FCAD-8E72-4490-9D67-FF3ADE8F49C3}" type="datetimeFigureOut">
               <a:rPr lang="ko-KR" altLang="en-US" smtClean="0"/>
-              <a:t>2021-08-29</a:t>
+              <a:t>2021-10-21</a:t>
             </a:fld>
             <a:endParaRPr lang="ko-KR" altLang="en-US"/>
           </a:p>
@@ -2412,7 +2412,7 @@
           <a:p>
             <a:fld id="{D512FCAD-8E72-4490-9D67-FF3ADE8F49C3}" type="datetimeFigureOut">
               <a:rPr lang="ko-KR" altLang="en-US" smtClean="0"/>
-              <a:t>2021-08-29</a:t>
+              <a:t>2021-10-21</a:t>
             </a:fld>
             <a:endParaRPr lang="ko-KR" altLang="en-US"/>
           </a:p>
@@ -2700,7 +2700,7 @@
           <a:p>
             <a:fld id="{D512FCAD-8E72-4490-9D67-FF3ADE8F49C3}" type="datetimeFigureOut">
               <a:rPr lang="ko-KR" altLang="en-US" smtClean="0"/>
-              <a:t>2021-08-29</a:t>
+              <a:t>2021-10-21</a:t>
             </a:fld>
             <a:endParaRPr lang="ko-KR" altLang="en-US"/>
           </a:p>
@@ -2941,7 +2941,7 @@
           <a:p>
             <a:fld id="{D512FCAD-8E72-4490-9D67-FF3ADE8F49C3}" type="datetimeFigureOut">
               <a:rPr lang="ko-KR" altLang="en-US" smtClean="0"/>
-              <a:t>2021-08-29</a:t>
+              <a:t>2021-10-21</a:t>
             </a:fld>
             <a:endParaRPr lang="ko-KR" altLang="en-US"/>
           </a:p>
@@ -4850,7 +4850,15 @@
             </a:r>
             <a:r>
               <a:rPr lang="ko-KR" altLang="en-US" sz="2500" dirty="0"/>
-              <a:t> 객체 선언</a:t>
+              <a:t> </a:t>
+            </a:r>
+            <a:r>
+              <a:rPr lang="en-US" altLang="ko-KR" sz="2500" dirty="0"/>
+              <a:t>size check bot </a:t>
+            </a:r>
+            <a:r>
+              <a:rPr lang="ko-KR" altLang="en-US" sz="2500" dirty="0"/>
+              <a:t>객체 선언</a:t>
             </a:r>
             <a:endParaRPr lang="en-US" altLang="ko-KR" sz="2500" dirty="0"/>
           </a:p>

</xml_diff>